<commit_message>
Added pictures to PP, added Source for Sensitivity
</commit_message>
<xml_diff>
--- a/Feigenbaum&Sensitivität.pptx
+++ b/Feigenbaum&Sensitivität.pptx
@@ -302,7 +302,7 @@
           <a:p>
             <a:fld id="{4AAD347D-5ACD-4C99-B74B-A9C85AD731AF}" type="datetimeFigureOut">
               <a:rPr lang="en-US" dirty="0"/>
-              <a:t>6/26/2020</a:t>
+              <a:t>6/28/2020</a:t>
             </a:fld>
             <a:endParaRPr lang="en-US" dirty="0"/>
           </a:p>
@@ -572,7 +572,7 @@
           <a:p>
             <a:fld id="{4509A250-FF31-4206-8172-F9D3106AACB1}" type="datetimeFigureOut">
               <a:rPr lang="en-US" dirty="0"/>
-              <a:t>6/26/2020</a:t>
+              <a:t>6/28/2020</a:t>
             </a:fld>
             <a:endParaRPr lang="en-US" dirty="0"/>
           </a:p>
@@ -761,7 +761,7 @@
           <a:p>
             <a:fld id="{4509A250-FF31-4206-8172-F9D3106AACB1}" type="datetimeFigureOut">
               <a:rPr lang="en-US" dirty="0"/>
-              <a:t>6/26/2020</a:t>
+              <a:t>6/28/2020</a:t>
             </a:fld>
             <a:endParaRPr lang="en-US" dirty="0"/>
           </a:p>
@@ -1029,7 +1029,7 @@
           <a:p>
             <a:fld id="{4509A250-FF31-4206-8172-F9D3106AACB1}" type="datetimeFigureOut">
               <a:rPr lang="en-US" dirty="0"/>
-              <a:t>6/26/2020</a:t>
+              <a:t>6/28/2020</a:t>
             </a:fld>
             <a:endParaRPr lang="en-US" dirty="0"/>
           </a:p>
@@ -1365,7 +1365,7 @@
           <a:p>
             <a:fld id="{4509A250-FF31-4206-8172-F9D3106AACB1}" type="datetimeFigureOut">
               <a:rPr lang="en-US" dirty="0"/>
-              <a:t>6/26/2020</a:t>
+              <a:t>6/28/2020</a:t>
             </a:fld>
             <a:endParaRPr lang="en-US" dirty="0"/>
           </a:p>
@@ -1983,7 +1983,7 @@
           <a:p>
             <a:fld id="{4509A250-FF31-4206-8172-F9D3106AACB1}" type="datetimeFigureOut">
               <a:rPr lang="en-US" dirty="0"/>
-              <a:t>6/26/2020</a:t>
+              <a:t>6/28/2020</a:t>
             </a:fld>
             <a:endParaRPr lang="en-US" dirty="0"/>
           </a:p>
@@ -2838,7 +2838,7 @@
           <a:p>
             <a:fld id="{4509A250-FF31-4206-8172-F9D3106AACB1}" type="datetimeFigureOut">
               <a:rPr lang="en-US" dirty="0"/>
-              <a:t>6/26/2020</a:t>
+              <a:t>6/28/2020</a:t>
             </a:fld>
             <a:endParaRPr lang="en-US" dirty="0"/>
           </a:p>
@@ -3003,7 +3003,7 @@
           <a:p>
             <a:fld id="{4509A250-FF31-4206-8172-F9D3106AACB1}" type="datetimeFigureOut">
               <a:rPr lang="en-US" dirty="0"/>
-              <a:t>6/26/2020</a:t>
+              <a:t>6/28/2020</a:t>
             </a:fld>
             <a:endParaRPr lang="en-US" dirty="0"/>
           </a:p>
@@ -3178,7 +3178,7 @@
           <a:p>
             <a:fld id="{4509A250-FF31-4206-8172-F9D3106AACB1}" type="datetimeFigureOut">
               <a:rPr lang="en-US" dirty="0"/>
-              <a:t>6/26/2020</a:t>
+              <a:t>6/28/2020</a:t>
             </a:fld>
             <a:endParaRPr lang="en-US" dirty="0"/>
           </a:p>
@@ -3343,7 +3343,7 @@
           <a:p>
             <a:fld id="{4509A250-FF31-4206-8172-F9D3106AACB1}" type="datetimeFigureOut">
               <a:rPr lang="en-US" dirty="0"/>
-              <a:t>6/26/2020</a:t>
+              <a:t>6/28/2020</a:t>
             </a:fld>
             <a:endParaRPr lang="en-US" dirty="0"/>
           </a:p>
@@ -3585,7 +3585,7 @@
           <a:p>
             <a:fld id="{9796027F-7875-4030-9381-8BD8C4F21935}" type="datetimeFigureOut">
               <a:rPr lang="en-US" dirty="0"/>
-              <a:t>6/26/2020</a:t>
+              <a:t>6/28/2020</a:t>
             </a:fld>
             <a:endParaRPr lang="en-US" dirty="0"/>
           </a:p>
@@ -3872,7 +3872,7 @@
           <a:p>
             <a:fld id="{9796027F-7875-4030-9381-8BD8C4F21935}" type="datetimeFigureOut">
               <a:rPr lang="en-US" dirty="0"/>
-              <a:t>6/26/2020</a:t>
+              <a:t>6/28/2020</a:t>
             </a:fld>
             <a:endParaRPr lang="en-US" dirty="0"/>
           </a:p>
@@ -4311,7 +4311,7 @@
           <a:p>
             <a:fld id="{9796027F-7875-4030-9381-8BD8C4F21935}" type="datetimeFigureOut">
               <a:rPr lang="en-US" dirty="0"/>
-              <a:t>6/26/2020</a:t>
+              <a:t>6/28/2020</a:t>
             </a:fld>
             <a:endParaRPr lang="en-US" dirty="0"/>
           </a:p>
@@ -4424,7 +4424,7 @@
           <a:p>
             <a:fld id="{4509A250-FF31-4206-8172-F9D3106AACB1}" type="datetimeFigureOut">
               <a:rPr lang="en-US" dirty="0"/>
-              <a:t>6/26/2020</a:t>
+              <a:t>6/28/2020</a:t>
             </a:fld>
             <a:endParaRPr lang="en-US" dirty="0"/>
           </a:p>
@@ -4514,7 +4514,7 @@
           <a:p>
             <a:fld id="{4509A250-FF31-4206-8172-F9D3106AACB1}" type="datetimeFigureOut">
               <a:rPr lang="en-US" dirty="0"/>
-              <a:t>6/26/2020</a:t>
+              <a:t>6/28/2020</a:t>
             </a:fld>
             <a:endParaRPr lang="en-US" dirty="0"/>
           </a:p>
@@ -4788,7 +4788,7 @@
           <a:p>
             <a:fld id="{4509A250-FF31-4206-8172-F9D3106AACB1}" type="datetimeFigureOut">
               <a:rPr lang="en-US" dirty="0"/>
-              <a:t>6/26/2020</a:t>
+              <a:t>6/28/2020</a:t>
             </a:fld>
             <a:endParaRPr lang="en-US" dirty="0"/>
           </a:p>
@@ -5058,7 +5058,7 @@
           <a:p>
             <a:fld id="{4509A250-FF31-4206-8172-F9D3106AACB1}" type="datetimeFigureOut">
               <a:rPr lang="en-US" dirty="0"/>
-              <a:t>6/26/2020</a:t>
+              <a:t>6/28/2020</a:t>
             </a:fld>
             <a:endParaRPr lang="en-US" dirty="0"/>
           </a:p>
@@ -5482,7 +5482,7 @@
           <a:p>
             <a:fld id="{4AAD347D-5ACD-4C99-B74B-A9C85AD731AF}" type="datetimeFigureOut">
               <a:rPr lang="en-US" dirty="0"/>
-              <a:t>6/26/2020</a:t>
+              <a:t>6/28/2020</a:t>
             </a:fld>
             <a:endParaRPr lang="en-US" dirty="0"/>
           </a:p>
@@ -6578,24 +6578,6 @@
       </p:sp>
       <p:sp>
         <p:nvSpPr>
-          <p:cNvPr id="3" name="Inhaltsplatzhalter 2">
-            <a:extLst>
-              <a:ext uri="{FF2B5EF4-FFF2-40B4-BE49-F238E27FC236}">
-                <a16:creationId xmlns:a16="http://schemas.microsoft.com/office/drawing/2014/main" id="{86333AB8-F116-4970-95B9-753E4EFA8665}"/>
-              </a:ext>
-            </a:extLst>
-          </p:cNvPr>
-          <p:cNvSpPr>
-            <a:spLocks noGrp="1"/>
-          </p:cNvSpPr>
-          <p:nvPr>
-            <p:ph type="pic" idx="1"/>
-          </p:nvPr>
-        </p:nvSpPr>
-        <p:spPr/>
-      </p:sp>
-      <p:sp>
-        <p:nvSpPr>
           <p:cNvPr id="4" name="Textplatzhalter 3">
             <a:extLst>
               <a:ext uri="{FF2B5EF4-FFF2-40B4-BE49-F238E27FC236}">
@@ -6709,6 +6691,306 @@
           </a:p>
         </p:txBody>
       </p:sp>
+      <p:pic>
+        <p:nvPicPr>
+          <p:cNvPr id="8" name="Grafik 8">
+            <a:extLst>
+              <a:ext uri="{FF2B5EF4-FFF2-40B4-BE49-F238E27FC236}">
+                <a16:creationId xmlns:a16="http://schemas.microsoft.com/office/drawing/2014/main" id="{EE604E63-50A1-450E-B8EB-5990C9EABF7D}"/>
+              </a:ext>
+            </a:extLst>
+          </p:cNvPr>
+          <p:cNvPicPr>
+            <a:picLocks noChangeAspect="1"/>
+          </p:cNvPicPr>
+          <p:nvPr/>
+        </p:nvPicPr>
+        <p:blipFill>
+          <a:blip r:embed="rId2"/>
+          <a:stretch>
+            <a:fillRect/>
+          </a:stretch>
+        </p:blipFill>
+        <p:spPr>
+          <a:xfrm>
+            <a:off x="6420120" y="1766428"/>
+            <a:ext cx="5067725" cy="3369909"/>
+          </a:xfrm>
+          <a:prstGeom prst="rect">
+            <a:avLst/>
+          </a:prstGeom>
+        </p:spPr>
+      </p:pic>
+      <p:pic>
+        <p:nvPicPr>
+          <p:cNvPr id="9" name="Grafik 9">
+            <a:extLst>
+              <a:ext uri="{FF2B5EF4-FFF2-40B4-BE49-F238E27FC236}">
+                <a16:creationId xmlns:a16="http://schemas.microsoft.com/office/drawing/2014/main" id="{52B70C6B-4F7A-40FD-9ACF-B2CEC269F447}"/>
+              </a:ext>
+            </a:extLst>
+          </p:cNvPr>
+          <p:cNvPicPr>
+            <a:picLocks noChangeAspect="1"/>
+          </p:cNvPicPr>
+          <p:nvPr/>
+        </p:nvPicPr>
+        <p:blipFill>
+          <a:blip r:embed="rId3"/>
+          <a:stretch>
+            <a:fillRect/>
+          </a:stretch>
+        </p:blipFill>
+        <p:spPr>
+          <a:xfrm>
+            <a:off x="6437772" y="1761853"/>
+            <a:ext cx="5067725" cy="3369909"/>
+          </a:xfrm>
+          <a:prstGeom prst="rect">
+            <a:avLst/>
+          </a:prstGeom>
+        </p:spPr>
+      </p:pic>
+      <p:pic>
+        <p:nvPicPr>
+          <p:cNvPr id="10" name="Grafik 10">
+            <a:extLst>
+              <a:ext uri="{FF2B5EF4-FFF2-40B4-BE49-F238E27FC236}">
+                <a16:creationId xmlns:a16="http://schemas.microsoft.com/office/drawing/2014/main" id="{1AD6CB72-D852-4D88-B2AE-138E02BEE49D}"/>
+              </a:ext>
+            </a:extLst>
+          </p:cNvPr>
+          <p:cNvPicPr>
+            <a:picLocks noChangeAspect="1"/>
+          </p:cNvPicPr>
+          <p:nvPr/>
+        </p:nvPicPr>
+        <p:blipFill>
+          <a:blip r:embed="rId4"/>
+          <a:stretch>
+            <a:fillRect/>
+          </a:stretch>
+        </p:blipFill>
+        <p:spPr>
+          <a:xfrm>
+            <a:off x="6445190" y="1778408"/>
+            <a:ext cx="5074605" cy="3374484"/>
+          </a:xfrm>
+          <a:prstGeom prst="rect">
+            <a:avLst/>
+          </a:prstGeom>
+        </p:spPr>
+      </p:pic>
+      <p:pic>
+        <p:nvPicPr>
+          <p:cNvPr id="11" name="Grafik 11">
+            <a:extLst>
+              <a:ext uri="{FF2B5EF4-FFF2-40B4-BE49-F238E27FC236}">
+                <a16:creationId xmlns:a16="http://schemas.microsoft.com/office/drawing/2014/main" id="{38B21A47-5A7B-47FF-8AEB-00F39866456C}"/>
+              </a:ext>
+            </a:extLst>
+          </p:cNvPr>
+          <p:cNvPicPr>
+            <a:picLocks noChangeAspect="1"/>
+          </p:cNvPicPr>
+          <p:nvPr/>
+        </p:nvPicPr>
+        <p:blipFill>
+          <a:blip r:embed="rId5"/>
+          <a:stretch>
+            <a:fillRect/>
+          </a:stretch>
+        </p:blipFill>
+        <p:spPr>
+          <a:xfrm>
+            <a:off x="6485933" y="1768716"/>
+            <a:ext cx="5060845" cy="3365334"/>
+          </a:xfrm>
+          <a:prstGeom prst="rect">
+            <a:avLst/>
+          </a:prstGeom>
+        </p:spPr>
+      </p:pic>
+      <p:pic>
+        <p:nvPicPr>
+          <p:cNvPr id="12" name="Grafik 12">
+            <a:extLst>
+              <a:ext uri="{FF2B5EF4-FFF2-40B4-BE49-F238E27FC236}">
+                <a16:creationId xmlns:a16="http://schemas.microsoft.com/office/drawing/2014/main" id="{1325271B-24A1-4CB7-9E86-96E93FFF3924}"/>
+              </a:ext>
+            </a:extLst>
+          </p:cNvPr>
+          <p:cNvPicPr>
+            <a:picLocks noChangeAspect="1"/>
+          </p:cNvPicPr>
+          <p:nvPr/>
+        </p:nvPicPr>
+        <p:blipFill>
+          <a:blip r:embed="rId6"/>
+          <a:stretch>
+            <a:fillRect/>
+          </a:stretch>
+        </p:blipFill>
+        <p:spPr>
+          <a:xfrm>
+            <a:off x="6436048" y="1770528"/>
+            <a:ext cx="5074605" cy="3374484"/>
+          </a:xfrm>
+          <a:prstGeom prst="rect">
+            <a:avLst/>
+          </a:prstGeom>
+        </p:spPr>
+      </p:pic>
+      <p:pic>
+        <p:nvPicPr>
+          <p:cNvPr id="13" name="Grafik 13">
+            <a:extLst>
+              <a:ext uri="{FF2B5EF4-FFF2-40B4-BE49-F238E27FC236}">
+                <a16:creationId xmlns:a16="http://schemas.microsoft.com/office/drawing/2014/main" id="{85CE7E8F-32B8-4D79-948A-283ED796933A}"/>
+              </a:ext>
+            </a:extLst>
+          </p:cNvPr>
+          <p:cNvPicPr>
+            <a:picLocks noChangeAspect="1"/>
+          </p:cNvPicPr>
+          <p:nvPr/>
+        </p:nvPicPr>
+        <p:blipFill>
+          <a:blip r:embed="rId7"/>
+          <a:stretch>
+            <a:fillRect/>
+          </a:stretch>
+        </p:blipFill>
+        <p:spPr>
+          <a:xfrm>
+            <a:off x="6442929" y="1766428"/>
+            <a:ext cx="5060845" cy="3365334"/>
+          </a:xfrm>
+          <a:prstGeom prst="rect">
+            <a:avLst/>
+          </a:prstGeom>
+        </p:spPr>
+      </p:pic>
+      <p:pic>
+        <p:nvPicPr>
+          <p:cNvPr id="14" name="Grafik 14">
+            <a:extLst>
+              <a:ext uri="{FF2B5EF4-FFF2-40B4-BE49-F238E27FC236}">
+                <a16:creationId xmlns:a16="http://schemas.microsoft.com/office/drawing/2014/main" id="{DD0C934C-D9B4-486C-B47B-87C5BF7651EB}"/>
+              </a:ext>
+            </a:extLst>
+          </p:cNvPr>
+          <p:cNvPicPr>
+            <a:picLocks noChangeAspect="1"/>
+          </p:cNvPicPr>
+          <p:nvPr/>
+        </p:nvPicPr>
+        <p:blipFill>
+          <a:blip r:embed="rId8"/>
+          <a:stretch>
+            <a:fillRect/>
+          </a:stretch>
+        </p:blipFill>
+        <p:spPr>
+          <a:xfrm>
+            <a:off x="6430440" y="1764140"/>
+            <a:ext cx="5060845" cy="3365334"/>
+          </a:xfrm>
+          <a:prstGeom prst="rect">
+            <a:avLst/>
+          </a:prstGeom>
+        </p:spPr>
+      </p:pic>
+      <p:pic>
+        <p:nvPicPr>
+          <p:cNvPr id="15" name="Grafik 15">
+            <a:extLst>
+              <a:ext uri="{FF2B5EF4-FFF2-40B4-BE49-F238E27FC236}">
+                <a16:creationId xmlns:a16="http://schemas.microsoft.com/office/drawing/2014/main" id="{2A565392-F557-4999-8786-7FF0E3E5F1AA}"/>
+              </a:ext>
+            </a:extLst>
+          </p:cNvPr>
+          <p:cNvPicPr>
+            <a:picLocks noChangeAspect="1"/>
+          </p:cNvPicPr>
+          <p:nvPr/>
+        </p:nvPicPr>
+        <p:blipFill>
+          <a:blip r:embed="rId9"/>
+          <a:stretch>
+            <a:fillRect/>
+          </a:stretch>
+        </p:blipFill>
+        <p:spPr>
+          <a:xfrm>
+            <a:off x="6426906" y="1762648"/>
+            <a:ext cx="5053964" cy="3360758"/>
+          </a:xfrm>
+          <a:prstGeom prst="rect">
+            <a:avLst/>
+          </a:prstGeom>
+        </p:spPr>
+      </p:pic>
+      <p:pic>
+        <p:nvPicPr>
+          <p:cNvPr id="16" name="Grafik 16">
+            <a:extLst>
+              <a:ext uri="{FF2B5EF4-FFF2-40B4-BE49-F238E27FC236}">
+                <a16:creationId xmlns:a16="http://schemas.microsoft.com/office/drawing/2014/main" id="{DABB2EDE-2B79-4F37-945F-55935D9CDE56}"/>
+              </a:ext>
+            </a:extLst>
+          </p:cNvPr>
+          <p:cNvPicPr>
+            <a:picLocks noChangeAspect="1"/>
+          </p:cNvPicPr>
+          <p:nvPr/>
+        </p:nvPicPr>
+        <p:blipFill>
+          <a:blip r:embed="rId10"/>
+          <a:stretch>
+            <a:fillRect/>
+          </a:stretch>
+        </p:blipFill>
+        <p:spPr>
+          <a:xfrm>
+            <a:off x="6437772" y="1756260"/>
+            <a:ext cx="5060845" cy="3365334"/>
+          </a:xfrm>
+          <a:prstGeom prst="rect">
+            <a:avLst/>
+          </a:prstGeom>
+        </p:spPr>
+      </p:pic>
+      <p:pic>
+        <p:nvPicPr>
+          <p:cNvPr id="17" name="Grafik 17">
+            <a:extLst>
+              <a:ext uri="{FF2B5EF4-FFF2-40B4-BE49-F238E27FC236}">
+                <a16:creationId xmlns:a16="http://schemas.microsoft.com/office/drawing/2014/main" id="{09BDB079-D61F-4903-9420-27E7953102FA}"/>
+              </a:ext>
+            </a:extLst>
+          </p:cNvPr>
+          <p:cNvPicPr>
+            <a:picLocks noChangeAspect="1"/>
+          </p:cNvPicPr>
+          <p:nvPr/>
+        </p:nvPicPr>
+        <p:blipFill>
+          <a:blip r:embed="rId11"/>
+          <a:stretch>
+            <a:fillRect/>
+          </a:stretch>
+        </p:blipFill>
+        <p:spPr>
+          <a:xfrm>
+            <a:off x="6426906" y="1770528"/>
+            <a:ext cx="5074605" cy="3374484"/>
+          </a:xfrm>
+          <a:prstGeom prst="rect">
+            <a:avLst/>
+          </a:prstGeom>
+        </p:spPr>
+      </p:pic>
     </p:spTree>
     <p:extLst>
       <p:ext uri="{BB962C8B-B14F-4D97-AF65-F5344CB8AC3E}">
@@ -6719,6 +7001,783 @@
   <p:clrMapOvr>
     <a:masterClrMapping/>
   </p:clrMapOvr>
+  <p:timing>
+    <p:tnLst>
+      <p:par>
+        <p:cTn id="1" dur="indefinite" restart="never" nodeType="tmRoot">
+          <p:childTnLst>
+            <p:seq concurrent="1" nextAc="seek">
+              <p:cTn id="2" dur="indefinite" nodeType="mainSeq">
+                <p:childTnLst>
+                  <p:par>
+                    <p:cTn id="3" fill="hold">
+                      <p:stCondLst>
+                        <p:cond delay="indefinite"/>
+                      </p:stCondLst>
+                      <p:childTnLst>
+                        <p:par>
+                          <p:cTn id="4" fill="hold">
+                            <p:stCondLst>
+                              <p:cond delay="0"/>
+                            </p:stCondLst>
+                            <p:childTnLst>
+                              <p:par>
+                                <p:cTn id="5" presetID="1" presetClass="entr" presetSubtype="0" fill="hold" nodeType="clickEffect">
+                                  <p:stCondLst>
+                                    <p:cond delay="0"/>
+                                  </p:stCondLst>
+                                  <p:childTnLst>
+                                    <p:set>
+                                      <p:cBhvr>
+                                        <p:cTn id="6" dur="1" fill="hold">
+                                          <p:stCondLst>
+                                            <p:cond delay="0"/>
+                                          </p:stCondLst>
+                                        </p:cTn>
+                                        <p:tgtEl>
+                                          <p:spTgt spid="8"/>
+                                        </p:tgtEl>
+                                        <p:attrNameLst>
+                                          <p:attrName>style.visibility</p:attrName>
+                                        </p:attrNameLst>
+                                      </p:cBhvr>
+                                      <p:to>
+                                        <p:strVal val="visible"/>
+                                      </p:to>
+                                    </p:set>
+                                  </p:childTnLst>
+                                </p:cTn>
+                              </p:par>
+                            </p:childTnLst>
+                          </p:cTn>
+                        </p:par>
+                      </p:childTnLst>
+                    </p:cTn>
+                  </p:par>
+                  <p:par>
+                    <p:cTn id="7" fill="hold">
+                      <p:stCondLst>
+                        <p:cond delay="indefinite"/>
+                      </p:stCondLst>
+                      <p:childTnLst>
+                        <p:par>
+                          <p:cTn id="8" fill="hold">
+                            <p:stCondLst>
+                              <p:cond delay="0"/>
+                            </p:stCondLst>
+                            <p:childTnLst>
+                              <p:par>
+                                <p:cTn id="9" presetID="1" presetClass="entr" presetSubtype="0" fill="hold" nodeType="clickEffect">
+                                  <p:stCondLst>
+                                    <p:cond delay="0"/>
+                                  </p:stCondLst>
+                                  <p:childTnLst>
+                                    <p:set>
+                                      <p:cBhvr>
+                                        <p:cTn id="10" dur="1" fill="hold">
+                                          <p:stCondLst>
+                                            <p:cond delay="0"/>
+                                          </p:stCondLst>
+                                        </p:cTn>
+                                        <p:tgtEl>
+                                          <p:spTgt spid="9"/>
+                                        </p:tgtEl>
+                                        <p:attrNameLst>
+                                          <p:attrName>style.visibility</p:attrName>
+                                        </p:attrNameLst>
+                                      </p:cBhvr>
+                                      <p:to>
+                                        <p:strVal val="visible"/>
+                                      </p:to>
+                                    </p:set>
+                                  </p:childTnLst>
+                                </p:cTn>
+                              </p:par>
+                            </p:childTnLst>
+                          </p:cTn>
+                        </p:par>
+                      </p:childTnLst>
+                    </p:cTn>
+                  </p:par>
+                  <p:par>
+                    <p:cTn id="11" fill="hold">
+                      <p:stCondLst>
+                        <p:cond delay="indefinite"/>
+                      </p:stCondLst>
+                      <p:childTnLst>
+                        <p:par>
+                          <p:cTn id="12" fill="hold">
+                            <p:stCondLst>
+                              <p:cond delay="0"/>
+                            </p:stCondLst>
+                            <p:childTnLst>
+                              <p:par>
+                                <p:cTn id="13" presetID="1" presetClass="entr" presetSubtype="0" fill="hold" nodeType="clickEffect">
+                                  <p:stCondLst>
+                                    <p:cond delay="0"/>
+                                  </p:stCondLst>
+                                  <p:childTnLst>
+                                    <p:set>
+                                      <p:cBhvr>
+                                        <p:cTn id="14" dur="1" fill="hold">
+                                          <p:stCondLst>
+                                            <p:cond delay="0"/>
+                                          </p:stCondLst>
+                                        </p:cTn>
+                                        <p:tgtEl>
+                                          <p:spTgt spid="10"/>
+                                        </p:tgtEl>
+                                        <p:attrNameLst>
+                                          <p:attrName>style.visibility</p:attrName>
+                                        </p:attrNameLst>
+                                      </p:cBhvr>
+                                      <p:to>
+                                        <p:strVal val="visible"/>
+                                      </p:to>
+                                    </p:set>
+                                  </p:childTnLst>
+                                </p:cTn>
+                              </p:par>
+                            </p:childTnLst>
+                          </p:cTn>
+                        </p:par>
+                      </p:childTnLst>
+                    </p:cTn>
+                  </p:par>
+                  <p:par>
+                    <p:cTn id="15" fill="hold">
+                      <p:stCondLst>
+                        <p:cond delay="indefinite"/>
+                      </p:stCondLst>
+                      <p:childTnLst>
+                        <p:par>
+                          <p:cTn id="16" fill="hold">
+                            <p:stCondLst>
+                              <p:cond delay="0"/>
+                            </p:stCondLst>
+                            <p:childTnLst>
+                              <p:par>
+                                <p:cTn id="17" presetID="1" presetClass="entr" presetSubtype="0" fill="hold" nodeType="clickEffect">
+                                  <p:stCondLst>
+                                    <p:cond delay="0"/>
+                                  </p:stCondLst>
+                                  <p:childTnLst>
+                                    <p:set>
+                                      <p:cBhvr>
+                                        <p:cTn id="18" dur="1" fill="hold">
+                                          <p:stCondLst>
+                                            <p:cond delay="0"/>
+                                          </p:stCondLst>
+                                        </p:cTn>
+                                        <p:tgtEl>
+                                          <p:spTgt spid="11"/>
+                                        </p:tgtEl>
+                                        <p:attrNameLst>
+                                          <p:attrName>style.visibility</p:attrName>
+                                        </p:attrNameLst>
+                                      </p:cBhvr>
+                                      <p:to>
+                                        <p:strVal val="visible"/>
+                                      </p:to>
+                                    </p:set>
+                                  </p:childTnLst>
+                                </p:cTn>
+                              </p:par>
+                            </p:childTnLst>
+                          </p:cTn>
+                        </p:par>
+                      </p:childTnLst>
+                    </p:cTn>
+                  </p:par>
+                  <p:par>
+                    <p:cTn id="19" fill="hold">
+                      <p:stCondLst>
+                        <p:cond delay="indefinite"/>
+                      </p:stCondLst>
+                      <p:childTnLst>
+                        <p:par>
+                          <p:cTn id="20" fill="hold">
+                            <p:stCondLst>
+                              <p:cond delay="0"/>
+                            </p:stCondLst>
+                            <p:childTnLst>
+                              <p:par>
+                                <p:cTn id="21" presetID="1" presetClass="entr" presetSubtype="0" fill="hold" nodeType="clickEffect">
+                                  <p:stCondLst>
+                                    <p:cond delay="0"/>
+                                  </p:stCondLst>
+                                  <p:childTnLst>
+                                    <p:set>
+                                      <p:cBhvr>
+                                        <p:cTn id="22" dur="1" fill="hold">
+                                          <p:stCondLst>
+                                            <p:cond delay="0"/>
+                                          </p:stCondLst>
+                                        </p:cTn>
+                                        <p:tgtEl>
+                                          <p:spTgt spid="12"/>
+                                        </p:tgtEl>
+                                        <p:attrNameLst>
+                                          <p:attrName>style.visibility</p:attrName>
+                                        </p:attrNameLst>
+                                      </p:cBhvr>
+                                      <p:to>
+                                        <p:strVal val="visible"/>
+                                      </p:to>
+                                    </p:set>
+                                  </p:childTnLst>
+                                </p:cTn>
+                              </p:par>
+                            </p:childTnLst>
+                          </p:cTn>
+                        </p:par>
+                      </p:childTnLst>
+                    </p:cTn>
+                  </p:par>
+                  <p:par>
+                    <p:cTn id="23" fill="hold">
+                      <p:stCondLst>
+                        <p:cond delay="indefinite"/>
+                      </p:stCondLst>
+                      <p:childTnLst>
+                        <p:par>
+                          <p:cTn id="24" fill="hold">
+                            <p:stCondLst>
+                              <p:cond delay="0"/>
+                            </p:stCondLst>
+                            <p:childTnLst>
+                              <p:par>
+                                <p:cTn id="25" presetID="1" presetClass="entr" presetSubtype="0" fill="hold" nodeType="clickEffect">
+                                  <p:stCondLst>
+                                    <p:cond delay="0"/>
+                                  </p:stCondLst>
+                                  <p:childTnLst>
+                                    <p:set>
+                                      <p:cBhvr>
+                                        <p:cTn id="26" dur="1" fill="hold">
+                                          <p:stCondLst>
+                                            <p:cond delay="0"/>
+                                          </p:stCondLst>
+                                        </p:cTn>
+                                        <p:tgtEl>
+                                          <p:spTgt spid="13"/>
+                                        </p:tgtEl>
+                                        <p:attrNameLst>
+                                          <p:attrName>style.visibility</p:attrName>
+                                        </p:attrNameLst>
+                                      </p:cBhvr>
+                                      <p:to>
+                                        <p:strVal val="visible"/>
+                                      </p:to>
+                                    </p:set>
+                                  </p:childTnLst>
+                                </p:cTn>
+                              </p:par>
+                            </p:childTnLst>
+                          </p:cTn>
+                        </p:par>
+                      </p:childTnLst>
+                    </p:cTn>
+                  </p:par>
+                  <p:par>
+                    <p:cTn id="27" fill="hold">
+                      <p:stCondLst>
+                        <p:cond delay="indefinite"/>
+                      </p:stCondLst>
+                      <p:childTnLst>
+                        <p:par>
+                          <p:cTn id="28" fill="hold">
+                            <p:stCondLst>
+                              <p:cond delay="0"/>
+                            </p:stCondLst>
+                            <p:childTnLst>
+                              <p:par>
+                                <p:cTn id="29" presetID="1" presetClass="entr" presetSubtype="0" fill="hold" nodeType="clickEffect">
+                                  <p:stCondLst>
+                                    <p:cond delay="0"/>
+                                  </p:stCondLst>
+                                  <p:childTnLst>
+                                    <p:set>
+                                      <p:cBhvr>
+                                        <p:cTn id="30" dur="1" fill="hold">
+                                          <p:stCondLst>
+                                            <p:cond delay="0"/>
+                                          </p:stCondLst>
+                                        </p:cTn>
+                                        <p:tgtEl>
+                                          <p:spTgt spid="14"/>
+                                        </p:tgtEl>
+                                        <p:attrNameLst>
+                                          <p:attrName>style.visibility</p:attrName>
+                                        </p:attrNameLst>
+                                      </p:cBhvr>
+                                      <p:to>
+                                        <p:strVal val="visible"/>
+                                      </p:to>
+                                    </p:set>
+                                  </p:childTnLst>
+                                </p:cTn>
+                              </p:par>
+                            </p:childTnLst>
+                          </p:cTn>
+                        </p:par>
+                      </p:childTnLst>
+                    </p:cTn>
+                  </p:par>
+                  <p:par>
+                    <p:cTn id="31" fill="hold">
+                      <p:stCondLst>
+                        <p:cond delay="indefinite"/>
+                      </p:stCondLst>
+                      <p:childTnLst>
+                        <p:par>
+                          <p:cTn id="32" fill="hold">
+                            <p:stCondLst>
+                              <p:cond delay="0"/>
+                            </p:stCondLst>
+                            <p:childTnLst>
+                              <p:par>
+                                <p:cTn id="33" presetID="1" presetClass="entr" presetSubtype="0" fill="hold" nodeType="clickEffect">
+                                  <p:stCondLst>
+                                    <p:cond delay="0"/>
+                                  </p:stCondLst>
+                                  <p:childTnLst>
+                                    <p:set>
+                                      <p:cBhvr>
+                                        <p:cTn id="34" dur="1" fill="hold">
+                                          <p:stCondLst>
+                                            <p:cond delay="0"/>
+                                          </p:stCondLst>
+                                        </p:cTn>
+                                        <p:tgtEl>
+                                          <p:spTgt spid="15"/>
+                                        </p:tgtEl>
+                                        <p:attrNameLst>
+                                          <p:attrName>style.visibility</p:attrName>
+                                        </p:attrNameLst>
+                                      </p:cBhvr>
+                                      <p:to>
+                                        <p:strVal val="visible"/>
+                                      </p:to>
+                                    </p:set>
+                                  </p:childTnLst>
+                                </p:cTn>
+                              </p:par>
+                            </p:childTnLst>
+                          </p:cTn>
+                        </p:par>
+                      </p:childTnLst>
+                    </p:cTn>
+                  </p:par>
+                  <p:par>
+                    <p:cTn id="35" fill="hold">
+                      <p:stCondLst>
+                        <p:cond delay="indefinite"/>
+                      </p:stCondLst>
+                      <p:childTnLst>
+                        <p:par>
+                          <p:cTn id="36" fill="hold">
+                            <p:stCondLst>
+                              <p:cond delay="0"/>
+                            </p:stCondLst>
+                            <p:childTnLst>
+                              <p:par>
+                                <p:cTn id="37" presetID="1" presetClass="entr" presetSubtype="0" fill="hold" nodeType="clickEffect">
+                                  <p:stCondLst>
+                                    <p:cond delay="0"/>
+                                  </p:stCondLst>
+                                  <p:childTnLst>
+                                    <p:set>
+                                      <p:cBhvr>
+                                        <p:cTn id="38" dur="1" fill="hold">
+                                          <p:stCondLst>
+                                            <p:cond delay="0"/>
+                                          </p:stCondLst>
+                                        </p:cTn>
+                                        <p:tgtEl>
+                                          <p:spTgt spid="16"/>
+                                        </p:tgtEl>
+                                        <p:attrNameLst>
+                                          <p:attrName>style.visibility</p:attrName>
+                                        </p:attrNameLst>
+                                      </p:cBhvr>
+                                      <p:to>
+                                        <p:strVal val="visible"/>
+                                      </p:to>
+                                    </p:set>
+                                  </p:childTnLst>
+                                </p:cTn>
+                              </p:par>
+                            </p:childTnLst>
+                          </p:cTn>
+                        </p:par>
+                      </p:childTnLst>
+                    </p:cTn>
+                  </p:par>
+                  <p:par>
+                    <p:cTn id="39" fill="hold">
+                      <p:stCondLst>
+                        <p:cond delay="indefinite"/>
+                      </p:stCondLst>
+                      <p:childTnLst>
+                        <p:par>
+                          <p:cTn id="40" fill="hold">
+                            <p:stCondLst>
+                              <p:cond delay="0"/>
+                            </p:stCondLst>
+                            <p:childTnLst>
+                              <p:par>
+                                <p:cTn id="41" presetID="1" presetClass="entr" presetSubtype="0" fill="hold" nodeType="clickEffect">
+                                  <p:stCondLst>
+                                    <p:cond delay="0"/>
+                                  </p:stCondLst>
+                                  <p:childTnLst>
+                                    <p:set>
+                                      <p:cBhvr>
+                                        <p:cTn id="42" dur="1" fill="hold">
+                                          <p:stCondLst>
+                                            <p:cond delay="0"/>
+                                          </p:stCondLst>
+                                        </p:cTn>
+                                        <p:tgtEl>
+                                          <p:spTgt spid="17"/>
+                                        </p:tgtEl>
+                                        <p:attrNameLst>
+                                          <p:attrName>style.visibility</p:attrName>
+                                        </p:attrNameLst>
+                                      </p:cBhvr>
+                                      <p:to>
+                                        <p:strVal val="visible"/>
+                                      </p:to>
+                                    </p:set>
+                                  </p:childTnLst>
+                                </p:cTn>
+                              </p:par>
+                            </p:childTnLst>
+                          </p:cTn>
+                        </p:par>
+                      </p:childTnLst>
+                    </p:cTn>
+                  </p:par>
+                  <p:par>
+                    <p:cTn id="43" fill="hold">
+                      <p:stCondLst>
+                        <p:cond delay="indefinite"/>
+                      </p:stCondLst>
+                      <p:childTnLst>
+                        <p:par>
+                          <p:cTn id="44" fill="hold">
+                            <p:stCondLst>
+                              <p:cond delay="0"/>
+                            </p:stCondLst>
+                            <p:childTnLst>
+                              <p:par>
+                                <p:cTn id="45" presetID="1" presetClass="entr" presetSubtype="0" fill="hold" grpId="0" nodeType="clickEffect">
+                                  <p:stCondLst>
+                                    <p:cond delay="0"/>
+                                  </p:stCondLst>
+                                  <p:childTnLst>
+                                    <p:set>
+                                      <p:cBhvr>
+                                        <p:cTn id="46" dur="1" fill="hold">
+                                          <p:stCondLst>
+                                            <p:cond delay="0"/>
+                                          </p:stCondLst>
+                                        </p:cTn>
+                                        <p:tgtEl>
+                                          <p:spTgt spid="4">
+                                            <p:txEl>
+                                              <p:pRg st="0" end="0"/>
+                                            </p:txEl>
+                                          </p:spTgt>
+                                        </p:tgtEl>
+                                        <p:attrNameLst>
+                                          <p:attrName>style.visibility</p:attrName>
+                                        </p:attrNameLst>
+                                      </p:cBhvr>
+                                      <p:to>
+                                        <p:strVal val="visible"/>
+                                      </p:to>
+                                    </p:set>
+                                  </p:childTnLst>
+                                </p:cTn>
+                              </p:par>
+                            </p:childTnLst>
+                          </p:cTn>
+                        </p:par>
+                      </p:childTnLst>
+                    </p:cTn>
+                  </p:par>
+                  <p:par>
+                    <p:cTn id="47" fill="hold">
+                      <p:stCondLst>
+                        <p:cond delay="indefinite"/>
+                      </p:stCondLst>
+                      <p:childTnLst>
+                        <p:par>
+                          <p:cTn id="48" fill="hold">
+                            <p:stCondLst>
+                              <p:cond delay="0"/>
+                            </p:stCondLst>
+                            <p:childTnLst>
+                              <p:par>
+                                <p:cTn id="49" presetID="1" presetClass="entr" presetSubtype="0" fill="hold" grpId="0" nodeType="clickEffect">
+                                  <p:stCondLst>
+                                    <p:cond delay="0"/>
+                                  </p:stCondLst>
+                                  <p:childTnLst>
+                                    <p:set>
+                                      <p:cBhvr>
+                                        <p:cTn id="50" dur="1" fill="hold">
+                                          <p:stCondLst>
+                                            <p:cond delay="0"/>
+                                          </p:stCondLst>
+                                        </p:cTn>
+                                        <p:tgtEl>
+                                          <p:spTgt spid="4">
+                                            <p:txEl>
+                                              <p:pRg st="1" end="1"/>
+                                            </p:txEl>
+                                          </p:spTgt>
+                                        </p:tgtEl>
+                                        <p:attrNameLst>
+                                          <p:attrName>style.visibility</p:attrName>
+                                        </p:attrNameLst>
+                                      </p:cBhvr>
+                                      <p:to>
+                                        <p:strVal val="visible"/>
+                                      </p:to>
+                                    </p:set>
+                                  </p:childTnLst>
+                                </p:cTn>
+                              </p:par>
+                            </p:childTnLst>
+                          </p:cTn>
+                        </p:par>
+                      </p:childTnLst>
+                    </p:cTn>
+                  </p:par>
+                  <p:par>
+                    <p:cTn id="51" fill="hold">
+                      <p:stCondLst>
+                        <p:cond delay="indefinite"/>
+                      </p:stCondLst>
+                      <p:childTnLst>
+                        <p:par>
+                          <p:cTn id="52" fill="hold">
+                            <p:stCondLst>
+                              <p:cond delay="0"/>
+                            </p:stCondLst>
+                            <p:childTnLst>
+                              <p:par>
+                                <p:cTn id="53" presetID="1" presetClass="entr" presetSubtype="0" fill="hold" grpId="0" nodeType="clickEffect">
+                                  <p:stCondLst>
+                                    <p:cond delay="0"/>
+                                  </p:stCondLst>
+                                  <p:childTnLst>
+                                    <p:set>
+                                      <p:cBhvr>
+                                        <p:cTn id="54" dur="1" fill="hold">
+                                          <p:stCondLst>
+                                            <p:cond delay="0"/>
+                                          </p:stCondLst>
+                                        </p:cTn>
+                                        <p:tgtEl>
+                                          <p:spTgt spid="4">
+                                            <p:txEl>
+                                              <p:pRg st="2" end="2"/>
+                                            </p:txEl>
+                                          </p:spTgt>
+                                        </p:tgtEl>
+                                        <p:attrNameLst>
+                                          <p:attrName>style.visibility</p:attrName>
+                                        </p:attrNameLst>
+                                      </p:cBhvr>
+                                      <p:to>
+                                        <p:strVal val="visible"/>
+                                      </p:to>
+                                    </p:set>
+                                  </p:childTnLst>
+                                </p:cTn>
+                              </p:par>
+                            </p:childTnLst>
+                          </p:cTn>
+                        </p:par>
+                      </p:childTnLst>
+                    </p:cTn>
+                  </p:par>
+                  <p:par>
+                    <p:cTn id="55" fill="hold">
+                      <p:stCondLst>
+                        <p:cond delay="indefinite"/>
+                      </p:stCondLst>
+                      <p:childTnLst>
+                        <p:par>
+                          <p:cTn id="56" fill="hold">
+                            <p:stCondLst>
+                              <p:cond delay="0"/>
+                            </p:stCondLst>
+                            <p:childTnLst>
+                              <p:par>
+                                <p:cTn id="57" presetID="1" presetClass="entr" presetSubtype="0" fill="hold" grpId="0" nodeType="clickEffect">
+                                  <p:stCondLst>
+                                    <p:cond delay="0"/>
+                                  </p:stCondLst>
+                                  <p:childTnLst>
+                                    <p:set>
+                                      <p:cBhvr>
+                                        <p:cTn id="58" dur="1" fill="hold">
+                                          <p:stCondLst>
+                                            <p:cond delay="0"/>
+                                          </p:stCondLst>
+                                        </p:cTn>
+                                        <p:tgtEl>
+                                          <p:spTgt spid="4">
+                                            <p:txEl>
+                                              <p:pRg st="3" end="3"/>
+                                            </p:txEl>
+                                          </p:spTgt>
+                                        </p:tgtEl>
+                                        <p:attrNameLst>
+                                          <p:attrName>style.visibility</p:attrName>
+                                        </p:attrNameLst>
+                                      </p:cBhvr>
+                                      <p:to>
+                                        <p:strVal val="visible"/>
+                                      </p:to>
+                                    </p:set>
+                                  </p:childTnLst>
+                                </p:cTn>
+                              </p:par>
+                            </p:childTnLst>
+                          </p:cTn>
+                        </p:par>
+                      </p:childTnLst>
+                    </p:cTn>
+                  </p:par>
+                  <p:par>
+                    <p:cTn id="59" fill="hold">
+                      <p:stCondLst>
+                        <p:cond delay="indefinite"/>
+                      </p:stCondLst>
+                      <p:childTnLst>
+                        <p:par>
+                          <p:cTn id="60" fill="hold">
+                            <p:stCondLst>
+                              <p:cond delay="0"/>
+                            </p:stCondLst>
+                            <p:childTnLst>
+                              <p:par>
+                                <p:cTn id="61" presetID="1" presetClass="entr" presetSubtype="0" fill="hold" grpId="0" nodeType="clickEffect">
+                                  <p:stCondLst>
+                                    <p:cond delay="0"/>
+                                  </p:stCondLst>
+                                  <p:childTnLst>
+                                    <p:set>
+                                      <p:cBhvr>
+                                        <p:cTn id="62" dur="1" fill="hold">
+                                          <p:stCondLst>
+                                            <p:cond delay="0"/>
+                                          </p:stCondLst>
+                                        </p:cTn>
+                                        <p:tgtEl>
+                                          <p:spTgt spid="4">
+                                            <p:txEl>
+                                              <p:pRg st="4" end="4"/>
+                                            </p:txEl>
+                                          </p:spTgt>
+                                        </p:tgtEl>
+                                        <p:attrNameLst>
+                                          <p:attrName>style.visibility</p:attrName>
+                                        </p:attrNameLst>
+                                      </p:cBhvr>
+                                      <p:to>
+                                        <p:strVal val="visible"/>
+                                      </p:to>
+                                    </p:set>
+                                  </p:childTnLst>
+                                </p:cTn>
+                              </p:par>
+                            </p:childTnLst>
+                          </p:cTn>
+                        </p:par>
+                      </p:childTnLst>
+                    </p:cTn>
+                  </p:par>
+                  <p:par>
+                    <p:cTn id="63" fill="hold">
+                      <p:stCondLst>
+                        <p:cond delay="indefinite"/>
+                      </p:stCondLst>
+                      <p:childTnLst>
+                        <p:par>
+                          <p:cTn id="64" fill="hold">
+                            <p:stCondLst>
+                              <p:cond delay="0"/>
+                            </p:stCondLst>
+                            <p:childTnLst>
+                              <p:par>
+                                <p:cTn id="65" presetID="1" presetClass="entr" presetSubtype="0" fill="hold" grpId="0" nodeType="clickEffect">
+                                  <p:stCondLst>
+                                    <p:cond delay="0"/>
+                                  </p:stCondLst>
+                                  <p:childTnLst>
+                                    <p:set>
+                                      <p:cBhvr>
+                                        <p:cTn id="66" dur="1" fill="hold">
+                                          <p:stCondLst>
+                                            <p:cond delay="0"/>
+                                          </p:stCondLst>
+                                        </p:cTn>
+                                        <p:tgtEl>
+                                          <p:spTgt spid="4">
+                                            <p:txEl>
+                                              <p:pRg st="5" end="5"/>
+                                            </p:txEl>
+                                          </p:spTgt>
+                                        </p:tgtEl>
+                                        <p:attrNameLst>
+                                          <p:attrName>style.visibility</p:attrName>
+                                        </p:attrNameLst>
+                                      </p:cBhvr>
+                                      <p:to>
+                                        <p:strVal val="visible"/>
+                                      </p:to>
+                                    </p:set>
+                                  </p:childTnLst>
+                                </p:cTn>
+                              </p:par>
+                            </p:childTnLst>
+                          </p:cTn>
+                        </p:par>
+                      </p:childTnLst>
+                    </p:cTn>
+                  </p:par>
+                </p:childTnLst>
+              </p:cTn>
+              <p:prevCondLst>
+                <p:cond evt="onPrev" delay="0">
+                  <p:tgtEl>
+                    <p:sldTgt/>
+                  </p:tgtEl>
+                </p:cond>
+              </p:prevCondLst>
+              <p:nextCondLst>
+                <p:cond evt="onNext" delay="0">
+                  <p:tgtEl>
+                    <p:sldTgt/>
+                  </p:tgtEl>
+                </p:cond>
+              </p:nextCondLst>
+            </p:seq>
+          </p:childTnLst>
+        </p:cTn>
+      </p:par>
+    </p:tnLst>
+    <p:bldLst>
+      <p:bldP spid="4" grpId="0" uiExpand="1" build="p"/>
+    </p:bldLst>
+  </p:timing>
 </p:sld>
 </file>
 
@@ -6786,24 +7845,6 @@
       </p:sp>
       <p:sp>
         <p:nvSpPr>
-          <p:cNvPr id="3" name="Bildplatzhalter 2">
-            <a:extLst>
-              <a:ext uri="{FF2B5EF4-FFF2-40B4-BE49-F238E27FC236}">
-                <a16:creationId xmlns:a16="http://schemas.microsoft.com/office/drawing/2014/main" id="{ADA9FAA4-2D70-46E9-994A-D844548D5DAB}"/>
-              </a:ext>
-            </a:extLst>
-          </p:cNvPr>
-          <p:cNvSpPr>
-            <a:spLocks noGrp="1"/>
-          </p:cNvSpPr>
-          <p:nvPr>
-            <p:ph type="pic" idx="1"/>
-          </p:nvPr>
-        </p:nvSpPr>
-        <p:spPr/>
-      </p:sp>
-      <p:sp>
-        <p:nvSpPr>
           <p:cNvPr id="4" name="Textplatzhalter 3">
             <a:extLst>
               <a:ext uri="{FF2B5EF4-FFF2-40B4-BE49-F238E27FC236}">
@@ -6895,6 +7936,36 @@
           </a:p>
         </p:txBody>
       </p:sp>
+      <p:pic>
+        <p:nvPicPr>
+          <p:cNvPr id="5" name="Grafik 5">
+            <a:extLst>
+              <a:ext uri="{FF2B5EF4-FFF2-40B4-BE49-F238E27FC236}">
+                <a16:creationId xmlns:a16="http://schemas.microsoft.com/office/drawing/2014/main" id="{E683CE9C-B3C2-4232-B484-D23CA1389795}"/>
+              </a:ext>
+            </a:extLst>
+          </p:cNvPr>
+          <p:cNvPicPr>
+            <a:picLocks noChangeAspect="1"/>
+          </p:cNvPicPr>
+          <p:nvPr/>
+        </p:nvPicPr>
+        <p:blipFill>
+          <a:blip r:embed="rId2"/>
+          <a:stretch>
+            <a:fillRect/>
+          </a:stretch>
+        </p:blipFill>
+        <p:spPr>
+          <a:xfrm>
+            <a:off x="6416641" y="1787440"/>
+            <a:ext cx="4978656" cy="3283119"/>
+          </a:xfrm>
+          <a:prstGeom prst="rect">
+            <a:avLst/>
+          </a:prstGeom>
+        </p:spPr>
+      </p:pic>
     </p:spTree>
     <p:extLst>
       <p:ext uri="{BB962C8B-B14F-4D97-AF65-F5344CB8AC3E}">
@@ -6972,24 +8043,6 @@
       </p:sp>
       <p:sp>
         <p:nvSpPr>
-          <p:cNvPr id="3" name="Bildplatzhalter 2">
-            <a:extLst>
-              <a:ext uri="{FF2B5EF4-FFF2-40B4-BE49-F238E27FC236}">
-                <a16:creationId xmlns:a16="http://schemas.microsoft.com/office/drawing/2014/main" id="{671C5446-E8C2-493E-B506-F84E68EB8229}"/>
-              </a:ext>
-            </a:extLst>
-          </p:cNvPr>
-          <p:cNvSpPr>
-            <a:spLocks noGrp="1"/>
-          </p:cNvSpPr>
-          <p:nvPr>
-            <p:ph type="pic" idx="1"/>
-          </p:nvPr>
-        </p:nvSpPr>
-        <p:spPr/>
-      </p:sp>
-      <p:sp>
-        <p:nvSpPr>
           <p:cNvPr id="4" name="Textplatzhalter 3">
             <a:extLst>
               <a:ext uri="{FF2B5EF4-FFF2-40B4-BE49-F238E27FC236}">
@@ -7047,6 +8100,36 @@
           </a:p>
         </p:txBody>
       </p:sp>
+      <p:pic>
+        <p:nvPicPr>
+          <p:cNvPr id="9" name="Grafik 9">
+            <a:extLst>
+              <a:ext uri="{FF2B5EF4-FFF2-40B4-BE49-F238E27FC236}">
+                <a16:creationId xmlns:a16="http://schemas.microsoft.com/office/drawing/2014/main" id="{94515615-2CC4-41E7-9591-8B414BEBBDFE}"/>
+              </a:ext>
+            </a:extLst>
+          </p:cNvPr>
+          <p:cNvPicPr>
+            <a:picLocks noChangeAspect="1"/>
+          </p:cNvPicPr>
+          <p:nvPr/>
+        </p:nvPicPr>
+        <p:blipFill>
+          <a:blip r:embed="rId2"/>
+          <a:stretch>
+            <a:fillRect/>
+          </a:stretch>
+        </p:blipFill>
+        <p:spPr>
+          <a:xfrm>
+            <a:off x="6386850" y="1755689"/>
+            <a:ext cx="4985006" cy="3346622"/>
+          </a:xfrm>
+          <a:prstGeom prst="rect">
+            <a:avLst/>
+          </a:prstGeom>
+        </p:spPr>
+      </p:pic>
     </p:spTree>
     <p:extLst>
       <p:ext uri="{BB962C8B-B14F-4D97-AF65-F5344CB8AC3E}">
@@ -7292,11 +8375,13 @@
         <p:spPr>
           <a:xfrm>
             <a:off x="1103312" y="2052918"/>
-            <a:ext cx="8946541" cy="1745675"/>
+            <a:ext cx="8946541" cy="1703848"/>
           </a:xfrm>
         </p:spPr>
         <p:txBody>
-          <a:bodyPr/>
+          <a:bodyPr>
+            <a:normAutofit fontScale="92500" lnSpcReduction="20000"/>
+          </a:bodyPr>
           <a:lstStyle/>
           <a:p>
             <a:r>
@@ -7307,7 +8392,13 @@
           <a:p>
             <a:r>
               <a:rPr lang="de-DE" dirty="0"/>
-              <a:t>Kleine Änderungen haben völlig unterschiedliche Ergebnisse zur Folge, System wirkt chaotisch</a:t>
+              <a:t>Kleine Änderungen haben unterschiedliche Ergebnisse zur Folge</a:t>
+            </a:r>
+          </a:p>
+          <a:p>
+            <a:r>
+              <a:rPr lang="de-DE" dirty="0"/>
+              <a:t>Haben kleine Änderungen stark unterschiedliche Ergebnisse zu folge wirkt das System chaotisch</a:t>
             </a:r>
           </a:p>
           <a:p>

</xml_diff>

<commit_message>
Updated Feigenbaum-Quellen, bc old one didnt work anymore...
</commit_message>
<xml_diff>
--- a/Feigenbaum&Sensitivität.pptx
+++ b/Feigenbaum&Sensitivität.pptx
@@ -4,6 +4,9 @@
   <p:sldMasterIdLst>
     <p:sldMasterId id="2147483648" r:id="rId1"/>
   </p:sldMasterIdLst>
+  <p:notesMasterIdLst>
+    <p:notesMasterId r:id="rId12"/>
+  </p:notesMasterIdLst>
   <p:sldIdLst>
     <p:sldId id="256" r:id="rId2"/>
     <p:sldId id="257" r:id="rId3"/>
@@ -113,7 +116,529 @@
       </a:defRPr>
     </a:lvl9pPr>
   </p:defaultTextStyle>
+  <p:extLst>
+    <p:ext uri="{EFAFB233-063F-42B5-8137-9DF3F51BA10A}">
+      <p15:sldGuideLst xmlns:p15="http://schemas.microsoft.com/office/powerpoint/2012/main"/>
+    </p:ext>
+  </p:extLst>
 </p:presentation>
+</file>
+
+<file path=ppt/notesMasters/notesMaster1.xml><?xml version="1.0" encoding="utf-8"?>
+<p:notesMaster xmlns:a="http://schemas.openxmlformats.org/drawingml/2006/main" xmlns:r="http://schemas.openxmlformats.org/officeDocument/2006/relationships" xmlns:p="http://schemas.openxmlformats.org/presentationml/2006/main">
+  <p:cSld>
+    <p:bg>
+      <p:bgRef idx="1001">
+        <a:schemeClr val="bg1"/>
+      </p:bgRef>
+    </p:bg>
+    <p:spTree>
+      <p:nvGrpSpPr>
+        <p:cNvPr id="1" name=""/>
+        <p:cNvGrpSpPr/>
+        <p:nvPr/>
+      </p:nvGrpSpPr>
+      <p:grpSpPr>
+        <a:xfrm>
+          <a:off x="0" y="0"/>
+          <a:ext cx="0" cy="0"/>
+          <a:chOff x="0" y="0"/>
+          <a:chExt cx="0" cy="0"/>
+        </a:xfrm>
+      </p:grpSpPr>
+      <p:sp>
+        <p:nvSpPr>
+          <p:cNvPr id="2" name="Kopfzeilenplatzhalter 1"/>
+          <p:cNvSpPr>
+            <a:spLocks noGrp="1"/>
+          </p:cNvSpPr>
+          <p:nvPr>
+            <p:ph type="hdr" sz="quarter"/>
+          </p:nvPr>
+        </p:nvSpPr>
+        <p:spPr>
+          <a:xfrm>
+            <a:off x="0" y="0"/>
+            <a:ext cx="2971800" cy="458788"/>
+          </a:xfrm>
+          <a:prstGeom prst="rect">
+            <a:avLst/>
+          </a:prstGeom>
+        </p:spPr>
+        <p:txBody>
+          <a:bodyPr vert="horz" lIns="91440" tIns="45720" rIns="91440" bIns="45720" rtlCol="0"/>
+          <a:lstStyle>
+            <a:lvl1pPr algn="l">
+              <a:defRPr sz="1200"/>
+            </a:lvl1pPr>
+          </a:lstStyle>
+          <a:p>
+            <a:endParaRPr lang="de-DE"/>
+          </a:p>
+        </p:txBody>
+      </p:sp>
+      <p:sp>
+        <p:nvSpPr>
+          <p:cNvPr id="3" name="Datumsplatzhalter 2"/>
+          <p:cNvSpPr>
+            <a:spLocks noGrp="1"/>
+          </p:cNvSpPr>
+          <p:nvPr>
+            <p:ph type="dt" idx="1"/>
+          </p:nvPr>
+        </p:nvSpPr>
+        <p:spPr>
+          <a:xfrm>
+            <a:off x="3884613" y="0"/>
+            <a:ext cx="2971800" cy="458788"/>
+          </a:xfrm>
+          <a:prstGeom prst="rect">
+            <a:avLst/>
+          </a:prstGeom>
+        </p:spPr>
+        <p:txBody>
+          <a:bodyPr vert="horz" lIns="91440" tIns="45720" rIns="91440" bIns="45720" rtlCol="0"/>
+          <a:lstStyle>
+            <a:lvl1pPr algn="r">
+              <a:defRPr sz="1200"/>
+            </a:lvl1pPr>
+          </a:lstStyle>
+          <a:p>
+            <a:fld id="{7535A00B-4C44-4756-BF1C-915163F81596}" type="datetimeFigureOut">
+              <a:rPr lang="de-DE" smtClean="0"/>
+              <a:t>29.06.2020</a:t>
+            </a:fld>
+            <a:endParaRPr lang="de-DE"/>
+          </a:p>
+        </p:txBody>
+      </p:sp>
+      <p:sp>
+        <p:nvSpPr>
+          <p:cNvPr id="4" name="Folienbildplatzhalter 3"/>
+          <p:cNvSpPr>
+            <a:spLocks noGrp="1" noRot="1" noChangeAspect="1"/>
+          </p:cNvSpPr>
+          <p:nvPr>
+            <p:ph type="sldImg" idx="2"/>
+          </p:nvPr>
+        </p:nvSpPr>
+        <p:spPr>
+          <a:xfrm>
+            <a:off x="685800" y="1143000"/>
+            <a:ext cx="5486400" cy="3086100"/>
+          </a:xfrm>
+          <a:prstGeom prst="rect">
+            <a:avLst/>
+          </a:prstGeom>
+          <a:noFill/>
+          <a:ln w="12700">
+            <a:solidFill>
+              <a:prstClr val="black"/>
+            </a:solidFill>
+          </a:ln>
+        </p:spPr>
+        <p:txBody>
+          <a:bodyPr vert="horz" lIns="91440" tIns="45720" rIns="91440" bIns="45720" rtlCol="0" anchor="ctr"/>
+          <a:lstStyle/>
+          <a:p>
+            <a:endParaRPr lang="de-DE"/>
+          </a:p>
+        </p:txBody>
+      </p:sp>
+      <p:sp>
+        <p:nvSpPr>
+          <p:cNvPr id="5" name="Notizenplatzhalter 4"/>
+          <p:cNvSpPr>
+            <a:spLocks noGrp="1"/>
+          </p:cNvSpPr>
+          <p:nvPr>
+            <p:ph type="body" sz="quarter" idx="3"/>
+          </p:nvPr>
+        </p:nvSpPr>
+        <p:spPr>
+          <a:xfrm>
+            <a:off x="685800" y="4400550"/>
+            <a:ext cx="5486400" cy="3600450"/>
+          </a:xfrm>
+          <a:prstGeom prst="rect">
+            <a:avLst/>
+          </a:prstGeom>
+        </p:spPr>
+        <p:txBody>
+          <a:bodyPr vert="horz" lIns="91440" tIns="45720" rIns="91440" bIns="45720" rtlCol="0"/>
+          <a:lstStyle/>
+          <a:p>
+            <a:pPr lvl="0"/>
+            <a:r>
+              <a:rPr lang="de-DE"/>
+              <a:t>Mastertextformat bearbeiten</a:t>
+            </a:r>
+          </a:p>
+          <a:p>
+            <a:pPr lvl="1"/>
+            <a:r>
+              <a:rPr lang="de-DE"/>
+              <a:t>Zweite Ebene</a:t>
+            </a:r>
+          </a:p>
+          <a:p>
+            <a:pPr lvl="2"/>
+            <a:r>
+              <a:rPr lang="de-DE"/>
+              <a:t>Dritte Ebene</a:t>
+            </a:r>
+          </a:p>
+          <a:p>
+            <a:pPr lvl="3"/>
+            <a:r>
+              <a:rPr lang="de-DE"/>
+              <a:t>Vierte Ebene</a:t>
+            </a:r>
+          </a:p>
+          <a:p>
+            <a:pPr lvl="4"/>
+            <a:r>
+              <a:rPr lang="de-DE"/>
+              <a:t>Fünfte Ebene</a:t>
+            </a:r>
+          </a:p>
+        </p:txBody>
+      </p:sp>
+      <p:sp>
+        <p:nvSpPr>
+          <p:cNvPr id="6" name="Fußzeilenplatzhalter 5"/>
+          <p:cNvSpPr>
+            <a:spLocks noGrp="1"/>
+          </p:cNvSpPr>
+          <p:nvPr>
+            <p:ph type="ftr" sz="quarter" idx="4"/>
+          </p:nvPr>
+        </p:nvSpPr>
+        <p:spPr>
+          <a:xfrm>
+            <a:off x="0" y="8685213"/>
+            <a:ext cx="2971800" cy="458787"/>
+          </a:xfrm>
+          <a:prstGeom prst="rect">
+            <a:avLst/>
+          </a:prstGeom>
+        </p:spPr>
+        <p:txBody>
+          <a:bodyPr vert="horz" lIns="91440" tIns="45720" rIns="91440" bIns="45720" rtlCol="0" anchor="b"/>
+          <a:lstStyle>
+            <a:lvl1pPr algn="l">
+              <a:defRPr sz="1200"/>
+            </a:lvl1pPr>
+          </a:lstStyle>
+          <a:p>
+            <a:endParaRPr lang="de-DE"/>
+          </a:p>
+        </p:txBody>
+      </p:sp>
+      <p:sp>
+        <p:nvSpPr>
+          <p:cNvPr id="7" name="Foliennummernplatzhalter 6"/>
+          <p:cNvSpPr>
+            <a:spLocks noGrp="1"/>
+          </p:cNvSpPr>
+          <p:nvPr>
+            <p:ph type="sldNum" sz="quarter" idx="5"/>
+          </p:nvPr>
+        </p:nvSpPr>
+        <p:spPr>
+          <a:xfrm>
+            <a:off x="3884613" y="8685213"/>
+            <a:ext cx="2971800" cy="458787"/>
+          </a:xfrm>
+          <a:prstGeom prst="rect">
+            <a:avLst/>
+          </a:prstGeom>
+        </p:spPr>
+        <p:txBody>
+          <a:bodyPr vert="horz" lIns="91440" tIns="45720" rIns="91440" bIns="45720" rtlCol="0" anchor="b"/>
+          <a:lstStyle>
+            <a:lvl1pPr algn="r">
+              <a:defRPr sz="1200"/>
+            </a:lvl1pPr>
+          </a:lstStyle>
+          <a:p>
+            <a:fld id="{3E7C1206-0FDA-4814-8607-8C64959EBFFD}" type="slidenum">
+              <a:rPr lang="de-DE" smtClean="0"/>
+              <a:t>‹Nr.›</a:t>
+            </a:fld>
+            <a:endParaRPr lang="de-DE"/>
+          </a:p>
+        </p:txBody>
+      </p:sp>
+    </p:spTree>
+    <p:extLst>
+      <p:ext uri="{BB962C8B-B14F-4D97-AF65-F5344CB8AC3E}">
+        <p14:creationId xmlns:p14="http://schemas.microsoft.com/office/powerpoint/2010/main" val="1839393994"/>
+      </p:ext>
+    </p:extLst>
+  </p:cSld>
+  <p:clrMap bg1="lt1" tx1="dk1" bg2="lt2" tx2="dk2" accent1="accent1" accent2="accent2" accent3="accent3" accent4="accent4" accent5="accent5" accent6="accent6" hlink="hlink" folHlink="folHlink"/>
+  <p:notesStyle>
+    <a:lvl1pPr marL="0" algn="l" defTabSz="914400" rtl="0" eaLnBrk="1" latinLnBrk="0" hangingPunct="1">
+      <a:defRPr sz="1200" kern="1200">
+        <a:solidFill>
+          <a:schemeClr val="tx1"/>
+        </a:solidFill>
+        <a:latin typeface="+mn-lt"/>
+        <a:ea typeface="+mn-ea"/>
+        <a:cs typeface="+mn-cs"/>
+      </a:defRPr>
+    </a:lvl1pPr>
+    <a:lvl2pPr marL="457200" algn="l" defTabSz="914400" rtl="0" eaLnBrk="1" latinLnBrk="0" hangingPunct="1">
+      <a:defRPr sz="1200" kern="1200">
+        <a:solidFill>
+          <a:schemeClr val="tx1"/>
+        </a:solidFill>
+        <a:latin typeface="+mn-lt"/>
+        <a:ea typeface="+mn-ea"/>
+        <a:cs typeface="+mn-cs"/>
+      </a:defRPr>
+    </a:lvl2pPr>
+    <a:lvl3pPr marL="914400" algn="l" defTabSz="914400" rtl="0" eaLnBrk="1" latinLnBrk="0" hangingPunct="1">
+      <a:defRPr sz="1200" kern="1200">
+        <a:solidFill>
+          <a:schemeClr val="tx1"/>
+        </a:solidFill>
+        <a:latin typeface="+mn-lt"/>
+        <a:ea typeface="+mn-ea"/>
+        <a:cs typeface="+mn-cs"/>
+      </a:defRPr>
+    </a:lvl3pPr>
+    <a:lvl4pPr marL="1371600" algn="l" defTabSz="914400" rtl="0" eaLnBrk="1" latinLnBrk="0" hangingPunct="1">
+      <a:defRPr sz="1200" kern="1200">
+        <a:solidFill>
+          <a:schemeClr val="tx1"/>
+        </a:solidFill>
+        <a:latin typeface="+mn-lt"/>
+        <a:ea typeface="+mn-ea"/>
+        <a:cs typeface="+mn-cs"/>
+      </a:defRPr>
+    </a:lvl4pPr>
+    <a:lvl5pPr marL="1828800" algn="l" defTabSz="914400" rtl="0" eaLnBrk="1" latinLnBrk="0" hangingPunct="1">
+      <a:defRPr sz="1200" kern="1200">
+        <a:solidFill>
+          <a:schemeClr val="tx1"/>
+        </a:solidFill>
+        <a:latin typeface="+mn-lt"/>
+        <a:ea typeface="+mn-ea"/>
+        <a:cs typeface="+mn-cs"/>
+      </a:defRPr>
+    </a:lvl5pPr>
+    <a:lvl6pPr marL="2286000" algn="l" defTabSz="914400" rtl="0" eaLnBrk="1" latinLnBrk="0" hangingPunct="1">
+      <a:defRPr sz="1200" kern="1200">
+        <a:solidFill>
+          <a:schemeClr val="tx1"/>
+        </a:solidFill>
+        <a:latin typeface="+mn-lt"/>
+        <a:ea typeface="+mn-ea"/>
+        <a:cs typeface="+mn-cs"/>
+      </a:defRPr>
+    </a:lvl6pPr>
+    <a:lvl7pPr marL="2743200" algn="l" defTabSz="914400" rtl="0" eaLnBrk="1" latinLnBrk="0" hangingPunct="1">
+      <a:defRPr sz="1200" kern="1200">
+        <a:solidFill>
+          <a:schemeClr val="tx1"/>
+        </a:solidFill>
+        <a:latin typeface="+mn-lt"/>
+        <a:ea typeface="+mn-ea"/>
+        <a:cs typeface="+mn-cs"/>
+      </a:defRPr>
+    </a:lvl7pPr>
+    <a:lvl8pPr marL="3200400" algn="l" defTabSz="914400" rtl="0" eaLnBrk="1" latinLnBrk="0" hangingPunct="1">
+      <a:defRPr sz="1200" kern="1200">
+        <a:solidFill>
+          <a:schemeClr val="tx1"/>
+        </a:solidFill>
+        <a:latin typeface="+mn-lt"/>
+        <a:ea typeface="+mn-ea"/>
+        <a:cs typeface="+mn-cs"/>
+      </a:defRPr>
+    </a:lvl8pPr>
+    <a:lvl9pPr marL="3657600" algn="l" defTabSz="914400" rtl="0" eaLnBrk="1" latinLnBrk="0" hangingPunct="1">
+      <a:defRPr sz="1200" kern="1200">
+        <a:solidFill>
+          <a:schemeClr val="tx1"/>
+        </a:solidFill>
+        <a:latin typeface="+mn-lt"/>
+        <a:ea typeface="+mn-ea"/>
+        <a:cs typeface="+mn-cs"/>
+      </a:defRPr>
+    </a:lvl9pPr>
+  </p:notesStyle>
+</p:notesMaster>
+</file>
+
+<file path=ppt/notesSlides/notesSlide1.xml><?xml version="1.0" encoding="utf-8"?>
+<p:notes xmlns:a="http://schemas.openxmlformats.org/drawingml/2006/main" xmlns:r="http://schemas.openxmlformats.org/officeDocument/2006/relationships" xmlns:p="http://schemas.openxmlformats.org/presentationml/2006/main">
+  <p:cSld>
+    <p:spTree>
+      <p:nvGrpSpPr>
+        <p:cNvPr id="1" name=""/>
+        <p:cNvGrpSpPr/>
+        <p:nvPr/>
+      </p:nvGrpSpPr>
+      <p:grpSpPr>
+        <a:xfrm>
+          <a:off x="0" y="0"/>
+          <a:ext cx="0" cy="0"/>
+          <a:chOff x="0" y="0"/>
+          <a:chExt cx="0" cy="0"/>
+        </a:xfrm>
+      </p:grpSpPr>
+      <p:sp>
+        <p:nvSpPr>
+          <p:cNvPr id="2" name="Folienbildplatzhalter 1"/>
+          <p:cNvSpPr>
+            <a:spLocks noGrp="1" noRot="1" noChangeAspect="1"/>
+          </p:cNvSpPr>
+          <p:nvPr>
+            <p:ph type="sldImg"/>
+          </p:nvPr>
+        </p:nvSpPr>
+        <p:spPr/>
+      </p:sp>
+      <p:sp>
+        <p:nvSpPr>
+          <p:cNvPr id="3" name="Notizenplatzhalter 2"/>
+          <p:cNvSpPr>
+            <a:spLocks noGrp="1"/>
+          </p:cNvSpPr>
+          <p:nvPr>
+            <p:ph type="body" idx="1"/>
+          </p:nvPr>
+        </p:nvSpPr>
+        <p:spPr/>
+        <p:txBody>
+          <a:bodyPr/>
+          <a:lstStyle/>
+          <a:p>
+            <a:endParaRPr lang="de-DE" dirty="0"/>
+          </a:p>
+        </p:txBody>
+      </p:sp>
+      <p:sp>
+        <p:nvSpPr>
+          <p:cNvPr id="4" name="Foliennummernplatzhalter 3"/>
+          <p:cNvSpPr>
+            <a:spLocks noGrp="1"/>
+          </p:cNvSpPr>
+          <p:nvPr>
+            <p:ph type="sldNum" sz="quarter" idx="5"/>
+          </p:nvPr>
+        </p:nvSpPr>
+        <p:spPr/>
+        <p:txBody>
+          <a:bodyPr/>
+          <a:lstStyle/>
+          <a:p>
+            <a:fld id="{3E7C1206-0FDA-4814-8607-8C64959EBFFD}" type="slidenum">
+              <a:rPr lang="de-DE" smtClean="0"/>
+              <a:t>3</a:t>
+            </a:fld>
+            <a:endParaRPr lang="de-DE"/>
+          </a:p>
+        </p:txBody>
+      </p:sp>
+    </p:spTree>
+    <p:extLst>
+      <p:ext uri="{BB962C8B-B14F-4D97-AF65-F5344CB8AC3E}">
+        <p14:creationId xmlns:p14="http://schemas.microsoft.com/office/powerpoint/2010/main" val="2330478034"/>
+      </p:ext>
+    </p:extLst>
+  </p:cSld>
+  <p:clrMapOvr>
+    <a:masterClrMapping/>
+  </p:clrMapOvr>
+</p:notes>
+</file>
+
+<file path=ppt/notesSlides/notesSlide2.xml><?xml version="1.0" encoding="utf-8"?>
+<p:notes xmlns:a="http://schemas.openxmlformats.org/drawingml/2006/main" xmlns:r="http://schemas.openxmlformats.org/officeDocument/2006/relationships" xmlns:p="http://schemas.openxmlformats.org/presentationml/2006/main">
+  <p:cSld>
+    <p:spTree>
+      <p:nvGrpSpPr>
+        <p:cNvPr id="1" name=""/>
+        <p:cNvGrpSpPr/>
+        <p:nvPr/>
+      </p:nvGrpSpPr>
+      <p:grpSpPr>
+        <a:xfrm>
+          <a:off x="0" y="0"/>
+          <a:ext cx="0" cy="0"/>
+          <a:chOff x="0" y="0"/>
+          <a:chExt cx="0" cy="0"/>
+        </a:xfrm>
+      </p:grpSpPr>
+      <p:sp>
+        <p:nvSpPr>
+          <p:cNvPr id="2" name="Folienbildplatzhalter 1"/>
+          <p:cNvSpPr>
+            <a:spLocks noGrp="1" noRot="1" noChangeAspect="1"/>
+          </p:cNvSpPr>
+          <p:nvPr>
+            <p:ph type="sldImg"/>
+          </p:nvPr>
+        </p:nvSpPr>
+        <p:spPr/>
+      </p:sp>
+      <p:sp>
+        <p:nvSpPr>
+          <p:cNvPr id="3" name="Notizenplatzhalter 2"/>
+          <p:cNvSpPr>
+            <a:spLocks noGrp="1"/>
+          </p:cNvSpPr>
+          <p:nvPr>
+            <p:ph type="body" idx="1"/>
+          </p:nvPr>
+        </p:nvSpPr>
+        <p:spPr/>
+        <p:txBody>
+          <a:bodyPr/>
+          <a:lstStyle/>
+          <a:p>
+            <a:endParaRPr lang="de-DE" dirty="0"/>
+          </a:p>
+        </p:txBody>
+      </p:sp>
+      <p:sp>
+        <p:nvSpPr>
+          <p:cNvPr id="4" name="Foliennummernplatzhalter 3"/>
+          <p:cNvSpPr>
+            <a:spLocks noGrp="1"/>
+          </p:cNvSpPr>
+          <p:nvPr>
+            <p:ph type="sldNum" sz="quarter" idx="5"/>
+          </p:nvPr>
+        </p:nvSpPr>
+        <p:spPr/>
+        <p:txBody>
+          <a:bodyPr/>
+          <a:lstStyle/>
+          <a:p>
+            <a:fld id="{3E7C1206-0FDA-4814-8607-8C64959EBFFD}" type="slidenum">
+              <a:rPr lang="de-DE" smtClean="0"/>
+              <a:t>7</a:t>
+            </a:fld>
+            <a:endParaRPr lang="de-DE"/>
+          </a:p>
+        </p:txBody>
+      </p:sp>
+    </p:spTree>
+    <p:extLst>
+      <p:ext uri="{BB962C8B-B14F-4D97-AF65-F5344CB8AC3E}">
+        <p14:creationId xmlns:p14="http://schemas.microsoft.com/office/powerpoint/2010/main" val="3282016217"/>
+      </p:ext>
+    </p:extLst>
+  </p:cSld>
+  <p:clrMapOvr>
+    <a:masterClrMapping/>
+  </p:clrMapOvr>
+</p:notes>
 </file>
 
 <file path=ppt/slideLayouts/slideLayout1.xml><?xml version="1.0" encoding="utf-8"?>
@@ -302,7 +827,7 @@
           <a:p>
             <a:fld id="{4AAD347D-5ACD-4C99-B74B-A9C85AD731AF}" type="datetimeFigureOut">
               <a:rPr lang="en-US" dirty="0"/>
-              <a:t>6/28/2020</a:t>
+              <a:t>6/29/2020</a:t>
             </a:fld>
             <a:endParaRPr lang="en-US" dirty="0"/>
           </a:p>
@@ -572,7 +1097,7 @@
           <a:p>
             <a:fld id="{4509A250-FF31-4206-8172-F9D3106AACB1}" type="datetimeFigureOut">
               <a:rPr lang="en-US" dirty="0"/>
-              <a:t>6/28/2020</a:t>
+              <a:t>6/29/2020</a:t>
             </a:fld>
             <a:endParaRPr lang="en-US" dirty="0"/>
           </a:p>
@@ -761,7 +1286,7 @@
           <a:p>
             <a:fld id="{4509A250-FF31-4206-8172-F9D3106AACB1}" type="datetimeFigureOut">
               <a:rPr lang="en-US" dirty="0"/>
-              <a:t>6/28/2020</a:t>
+              <a:t>6/29/2020</a:t>
             </a:fld>
             <a:endParaRPr lang="en-US" dirty="0"/>
           </a:p>
@@ -1029,7 +1554,7 @@
           <a:p>
             <a:fld id="{4509A250-FF31-4206-8172-F9D3106AACB1}" type="datetimeFigureOut">
               <a:rPr lang="en-US" dirty="0"/>
-              <a:t>6/28/2020</a:t>
+              <a:t>6/29/2020</a:t>
             </a:fld>
             <a:endParaRPr lang="en-US" dirty="0"/>
           </a:p>
@@ -1365,7 +1890,7 @@
           <a:p>
             <a:fld id="{4509A250-FF31-4206-8172-F9D3106AACB1}" type="datetimeFigureOut">
               <a:rPr lang="en-US" dirty="0"/>
-              <a:t>6/28/2020</a:t>
+              <a:t>6/29/2020</a:t>
             </a:fld>
             <a:endParaRPr lang="en-US" dirty="0"/>
           </a:p>
@@ -1983,7 +2508,7 @@
           <a:p>
             <a:fld id="{4509A250-FF31-4206-8172-F9D3106AACB1}" type="datetimeFigureOut">
               <a:rPr lang="en-US" dirty="0"/>
-              <a:t>6/28/2020</a:t>
+              <a:t>6/29/2020</a:t>
             </a:fld>
             <a:endParaRPr lang="en-US" dirty="0"/>
           </a:p>
@@ -2838,7 +3363,7 @@
           <a:p>
             <a:fld id="{4509A250-FF31-4206-8172-F9D3106AACB1}" type="datetimeFigureOut">
               <a:rPr lang="en-US" dirty="0"/>
-              <a:t>6/28/2020</a:t>
+              <a:t>6/29/2020</a:t>
             </a:fld>
             <a:endParaRPr lang="en-US" dirty="0"/>
           </a:p>
@@ -3003,7 +3528,7 @@
           <a:p>
             <a:fld id="{4509A250-FF31-4206-8172-F9D3106AACB1}" type="datetimeFigureOut">
               <a:rPr lang="en-US" dirty="0"/>
-              <a:t>6/28/2020</a:t>
+              <a:t>6/29/2020</a:t>
             </a:fld>
             <a:endParaRPr lang="en-US" dirty="0"/>
           </a:p>
@@ -3178,7 +3703,7 @@
           <a:p>
             <a:fld id="{4509A250-FF31-4206-8172-F9D3106AACB1}" type="datetimeFigureOut">
               <a:rPr lang="en-US" dirty="0"/>
-              <a:t>6/28/2020</a:t>
+              <a:t>6/29/2020</a:t>
             </a:fld>
             <a:endParaRPr lang="en-US" dirty="0"/>
           </a:p>
@@ -3343,7 +3868,7 @@
           <a:p>
             <a:fld id="{4509A250-FF31-4206-8172-F9D3106AACB1}" type="datetimeFigureOut">
               <a:rPr lang="en-US" dirty="0"/>
-              <a:t>6/28/2020</a:t>
+              <a:t>6/29/2020</a:t>
             </a:fld>
             <a:endParaRPr lang="en-US" dirty="0"/>
           </a:p>
@@ -3585,7 +4110,7 @@
           <a:p>
             <a:fld id="{9796027F-7875-4030-9381-8BD8C4F21935}" type="datetimeFigureOut">
               <a:rPr lang="en-US" dirty="0"/>
-              <a:t>6/28/2020</a:t>
+              <a:t>6/29/2020</a:t>
             </a:fld>
             <a:endParaRPr lang="en-US" dirty="0"/>
           </a:p>
@@ -3872,7 +4397,7 @@
           <a:p>
             <a:fld id="{9796027F-7875-4030-9381-8BD8C4F21935}" type="datetimeFigureOut">
               <a:rPr lang="en-US" dirty="0"/>
-              <a:t>6/28/2020</a:t>
+              <a:t>6/29/2020</a:t>
             </a:fld>
             <a:endParaRPr lang="en-US" dirty="0"/>
           </a:p>
@@ -4311,7 +4836,7 @@
           <a:p>
             <a:fld id="{9796027F-7875-4030-9381-8BD8C4F21935}" type="datetimeFigureOut">
               <a:rPr lang="en-US" dirty="0"/>
-              <a:t>6/28/2020</a:t>
+              <a:t>6/29/2020</a:t>
             </a:fld>
             <a:endParaRPr lang="en-US" dirty="0"/>
           </a:p>
@@ -4424,7 +4949,7 @@
           <a:p>
             <a:fld id="{4509A250-FF31-4206-8172-F9D3106AACB1}" type="datetimeFigureOut">
               <a:rPr lang="en-US" dirty="0"/>
-              <a:t>6/28/2020</a:t>
+              <a:t>6/29/2020</a:t>
             </a:fld>
             <a:endParaRPr lang="en-US" dirty="0"/>
           </a:p>
@@ -4514,7 +5039,7 @@
           <a:p>
             <a:fld id="{4509A250-FF31-4206-8172-F9D3106AACB1}" type="datetimeFigureOut">
               <a:rPr lang="en-US" dirty="0"/>
-              <a:t>6/28/2020</a:t>
+              <a:t>6/29/2020</a:t>
             </a:fld>
             <a:endParaRPr lang="en-US" dirty="0"/>
           </a:p>
@@ -4788,7 +5313,7 @@
           <a:p>
             <a:fld id="{4509A250-FF31-4206-8172-F9D3106AACB1}" type="datetimeFigureOut">
               <a:rPr lang="en-US" dirty="0"/>
-              <a:t>6/28/2020</a:t>
+              <a:t>6/29/2020</a:t>
             </a:fld>
             <a:endParaRPr lang="en-US" dirty="0"/>
           </a:p>
@@ -5058,7 +5583,7 @@
           <a:p>
             <a:fld id="{4509A250-FF31-4206-8172-F9D3106AACB1}" type="datetimeFigureOut">
               <a:rPr lang="en-US" dirty="0"/>
-              <a:t>6/28/2020</a:t>
+              <a:t>6/29/2020</a:t>
             </a:fld>
             <a:endParaRPr lang="en-US" dirty="0"/>
           </a:p>
@@ -5482,7 +6007,7 @@
           <a:p>
             <a:fld id="{4AAD347D-5ACD-4C99-B74B-A9C85AD731AF}" type="datetimeFigureOut">
               <a:rPr lang="en-US" dirty="0"/>
-              <a:t>6/28/2020</a:t>
+              <a:t>6/29/2020</a:t>
             </a:fld>
             <a:endParaRPr lang="en-US" dirty="0"/>
           </a:p>
@@ -6062,6 +6587,53 @@
           </a:p>
         </p:txBody>
       </p:sp>
+      <p:sp>
+        <p:nvSpPr>
+          <p:cNvPr id="4" name="Textfeld 3">
+            <a:extLst>
+              <a:ext uri="{FF2B5EF4-FFF2-40B4-BE49-F238E27FC236}">
+                <a16:creationId xmlns:a16="http://schemas.microsoft.com/office/drawing/2014/main" id="{88C8650D-7CD5-4F0E-8BE9-271C6D8F700E}"/>
+              </a:ext>
+            </a:extLst>
+          </p:cNvPr>
+          <p:cNvSpPr txBox="1"/>
+          <p:nvPr/>
+        </p:nvSpPr>
+        <p:spPr>
+          <a:xfrm>
+            <a:off x="10481377" y="511499"/>
+            <a:ext cx="739491" cy="584775"/>
+          </a:xfrm>
+          <a:prstGeom prst="rect">
+            <a:avLst/>
+          </a:prstGeom>
+          <a:noFill/>
+        </p:spPr>
+        <p:txBody>
+          <a:bodyPr wrap="square" rtlCol="0">
+            <a:spAutoFit/>
+          </a:bodyPr>
+          <a:lstStyle/>
+          <a:p>
+            <a:pPr algn="l"/>
+            <a:r>
+              <a:rPr lang="de-DE" sz="800" dirty="0"/>
+              <a:t>Michael Rudyj,</a:t>
+            </a:r>
+          </a:p>
+          <a:p>
+            <a:pPr algn="l"/>
+            <a:endParaRPr lang="de-DE" sz="800" dirty="0"/>
+          </a:p>
+          <a:p>
+            <a:pPr algn="l"/>
+            <a:r>
+              <a:rPr lang="de-DE" sz="800" dirty="0"/>
+              <a:t>Gruppe 1</a:t>
+            </a:r>
+          </a:p>
+        </p:txBody>
+      </p:sp>
     </p:spTree>
     <p:extLst>
       <p:ext uri="{BB962C8B-B14F-4D97-AF65-F5344CB8AC3E}">
@@ -6117,6 +6689,17 @@
               <a:rPr lang="de-DE" dirty="0"/>
               <a:t>Quellen</a:t>
             </a:r>
+            <a:br>
+              <a:rPr lang="de-DE" dirty="0"/>
+            </a:br>
+            <a:br>
+              <a:rPr lang="de-DE" dirty="0"/>
+            </a:br>
+            <a:r>
+              <a:rPr lang="de-DE" sz="1100" dirty="0"/>
+              <a:t>Alle Quellen wurden am 29.06.2020 zuletzt aufgerufen</a:t>
+            </a:r>
+            <a:endParaRPr lang="de-DE" dirty="0"/>
           </a:p>
         </p:txBody>
       </p:sp>
@@ -6139,7 +6722,7 @@
         <p:spPr/>
         <p:txBody>
           <a:bodyPr>
-            <a:normAutofit fontScale="77500" lnSpcReduction="20000"/>
+            <a:normAutofit fontScale="55000" lnSpcReduction="20000"/>
           </a:bodyPr>
           <a:lstStyle/>
           <a:p>
@@ -6160,7 +6743,7 @@
                 <a:effectLst/>
                 <a:latin typeface="+mn-lt"/>
               </a:rPr>
-              <a:t>Diagramm erzeugen: </a:t>
+              <a:t>Diagramm: </a:t>
             </a:r>
           </a:p>
           <a:p>
@@ -6191,23 +6774,12 @@
             </a:endParaRPr>
           </a:p>
           <a:p>
-            <a:r>
-              <a:rPr lang="de-DE" sz="2600" b="0" i="0" dirty="0">
-                <a:effectLst/>
-                <a:latin typeface="+mn-lt"/>
-              </a:rPr>
-              <a:t>Feigenbaum-Konstante:</a:t>
-            </a:r>
-          </a:p>
-          <a:p>
             <a:pPr lvl="1"/>
             <a:r>
-              <a:rPr lang="de-DE" b="0" i="0" u="sng" dirty="0">
+              <a:rPr lang="de-DE" dirty="0">
                 <a:solidFill>
                   <a:schemeClr val="bg1"/>
                 </a:solidFill>
-                <a:effectLst/>
-                <a:latin typeface="Helvetica Neue"/>
                 <a:hlinkClick r:id="rId3">
                   <a:extLst>
                     <a:ext uri="{A12FA001-AC4F-418D-AE19-62706E023703}">
@@ -6216,14 +6788,24 @@
                   </a:extLst>
                 </a:hlinkClick>
               </a:rPr>
-              <a:t>https://physik.cosmos-indirekt.de/Physik-Schule/Feigenbaum-Konstante</a:t>
-            </a:r>
-            <a:endParaRPr lang="de-DE" u="sng" dirty="0">
+              <a:t>http://www.wolferseder.de/Feigenbaum.html</a:t>
+            </a:r>
+            <a:endParaRPr lang="de-DE" b="0" i="0" u="sng" dirty="0">
               <a:solidFill>
                 <a:schemeClr val="bg1"/>
               </a:solidFill>
+              <a:effectLst/>
               <a:latin typeface="Helvetica Neue"/>
             </a:endParaRPr>
+          </a:p>
+          <a:p>
+            <a:r>
+              <a:rPr lang="de-DE" sz="2600" b="0" i="0" dirty="0">
+                <a:effectLst/>
+                <a:latin typeface="+mn-lt"/>
+              </a:rPr>
+              <a:t>Feigenbaum-Konstante:</a:t>
+            </a:r>
           </a:p>
           <a:p>
             <a:pPr lvl="1"/>
@@ -6266,22 +6848,19 @@
           </a:p>
           <a:p>
             <a:r>
-              <a:rPr lang="de-DE" sz="2600" b="0" i="0" dirty="0">
-                <a:effectLst/>
+              <a:rPr lang="de-DE" sz="2600" dirty="0">
                 <a:latin typeface="+mn-lt"/>
               </a:rPr>
-              <a:t>Chaosforschung:</a:t>
+              <a:t>Sensitivität:</a:t>
             </a:r>
           </a:p>
           <a:p>
             <a:pPr lvl="1"/>
             <a:r>
-              <a:rPr lang="de-DE" b="0" i="0" u="sng" dirty="0">
+              <a:rPr lang="de-DE" sz="2200" dirty="0">
                 <a:solidFill>
                   <a:schemeClr val="bg1"/>
                 </a:solidFill>
-                <a:effectLst/>
-                <a:latin typeface="Helvetica Neue"/>
                 <a:hlinkClick r:id="rId5">
                   <a:extLst>
                     <a:ext uri="{A12FA001-AC4F-418D-AE19-62706E023703}">
@@ -6290,14 +6869,14 @@
                   </a:extLst>
                 </a:hlinkClick>
               </a:rPr>
-              <a:t>https://physik.cosmos-indirekt.de/Physik-Schule/Chaosforschung</a:t>
-            </a:r>
-            <a:endParaRPr lang="de-DE" b="0" i="0" dirty="0">
+              <a:t>http://osg-mainz.de/index.php/1774.html</a:t>
+            </a:r>
+            <a:endParaRPr lang="de-DE" sz="2400" b="0" i="0" dirty="0">
               <a:solidFill>
                 <a:schemeClr val="bg1"/>
               </a:solidFill>
               <a:effectLst/>
-              <a:latin typeface="Helvetica Neue"/>
+              <a:latin typeface="+mn-lt"/>
             </a:endParaRPr>
           </a:p>
           <a:p>
@@ -6306,18 +6885,16 @@
                 <a:effectLst/>
                 <a:latin typeface="+mn-lt"/>
               </a:rPr>
-              <a:t>Schmetterlingseffekt:</a:t>
+              <a:t>Chaosforschung:</a:t>
             </a:r>
           </a:p>
           <a:p>
             <a:pPr lvl="1"/>
             <a:r>
-              <a:rPr lang="de-DE" b="0" i="0" u="sng" dirty="0">
+              <a:rPr lang="de-DE" dirty="0">
                 <a:solidFill>
                   <a:schemeClr val="bg1"/>
                 </a:solidFill>
-                <a:effectLst/>
-                <a:latin typeface="Helvetica Neue"/>
                 <a:hlinkClick r:id="rId6">
                   <a:extLst>
                     <a:ext uri="{A12FA001-AC4F-418D-AE19-62706E023703}">
@@ -6326,25 +6903,21 @@
                   </a:extLst>
                 </a:hlinkClick>
               </a:rPr>
-              <a:t>https://www.br.de/wissen/edward-lorenz-meteorologe-schmetterlingseffekt-chaostheorie-100.html</a:t>
-            </a:r>
-            <a:endParaRPr lang="de-DE" b="0" i="0" dirty="0">
+              <a:t>https://www.complexity-research.com/KomplexiChaos.htm</a:t>
+            </a:r>
+            <a:endParaRPr lang="de-DE" dirty="0">
               <a:solidFill>
                 <a:schemeClr val="bg1"/>
               </a:solidFill>
-              <a:effectLst/>
-              <a:latin typeface="Helvetica Neue"/>
             </a:endParaRPr>
           </a:p>
           <a:p>
             <a:pPr lvl="1"/>
             <a:r>
-              <a:rPr lang="de-DE" b="0" i="0" u="sng" dirty="0">
+              <a:rPr lang="de-DE" dirty="0">
                 <a:solidFill>
                   <a:schemeClr val="bg1"/>
                 </a:solidFill>
-                <a:effectLst/>
-                <a:latin typeface="Helvetica Neue"/>
                 <a:hlinkClick r:id="rId7">
                   <a:extLst>
                     <a:ext uri="{A12FA001-AC4F-418D-AE19-62706E023703}">
@@ -6353,7 +6926,48 @@
                   </a:extLst>
                 </a:hlinkClick>
               </a:rPr>
-              <a:t>https://physik.cosmos-indirekt.de/Physik-Schule/Schmetterlingseffekt</a:t>
+              <a:t>https://www.lr-online.de/wie-chaos-unser-leben-bestimmt-_-grundlagen-und-anwendungsgebiete-der-chaostheorie-39178815.html</a:t>
+            </a:r>
+            <a:endParaRPr lang="de-DE" dirty="0">
+              <a:solidFill>
+                <a:schemeClr val="bg1"/>
+              </a:solidFill>
+            </a:endParaRPr>
+          </a:p>
+          <a:p>
+            <a:r>
+              <a:rPr lang="de-DE" sz="2600" b="0" i="0" dirty="0">
+                <a:effectLst/>
+                <a:latin typeface="+mn-lt"/>
+              </a:rPr>
+              <a:t>Schmetterlingseffekt</a:t>
+            </a:r>
+            <a:r>
+              <a:rPr lang="de-DE" sz="2800" b="0" i="0" dirty="0">
+                <a:effectLst/>
+                <a:latin typeface="+mn-lt"/>
+              </a:rPr>
+              <a:t>:</a:t>
+            </a:r>
+          </a:p>
+          <a:p>
+            <a:pPr lvl="1"/>
+            <a:r>
+              <a:rPr lang="de-DE" b="0" i="0" u="sng" dirty="0">
+                <a:solidFill>
+                  <a:schemeClr val="bg1"/>
+                </a:solidFill>
+                <a:effectLst/>
+                <a:latin typeface="Helvetica Neue"/>
+                <a:hlinkClick r:id="rId8">
+                  <a:extLst>
+                    <a:ext uri="{A12FA001-AC4F-418D-AE19-62706E023703}">
+                      <ahyp:hlinkClr xmlns:ahyp="http://schemas.microsoft.com/office/drawing/2018/hyperlinkcolor" val="tx"/>
+                    </a:ext>
+                  </a:extLst>
+                </a:hlinkClick>
+              </a:rPr>
+              <a:t>https://www.br.de/wissen/edward-lorenz-meteorologe-schmetterlingseffekt-chaostheorie-100.html</a:t>
             </a:r>
             <a:endParaRPr lang="de-DE" b="0" i="0" dirty="0">
               <a:solidFill>
@@ -6363,8 +6977,52 @@
               <a:latin typeface="Helvetica Neue"/>
             </a:endParaRPr>
           </a:p>
-          <a:p>
-            <a:endParaRPr lang="de-DE" dirty="0"/>
+        </p:txBody>
+      </p:sp>
+      <p:sp>
+        <p:nvSpPr>
+          <p:cNvPr id="5" name="Textfeld 4">
+            <a:extLst>
+              <a:ext uri="{FF2B5EF4-FFF2-40B4-BE49-F238E27FC236}">
+                <a16:creationId xmlns:a16="http://schemas.microsoft.com/office/drawing/2014/main" id="{C847C856-65BD-4E9D-AD36-39BD74DA74D7}"/>
+              </a:ext>
+            </a:extLst>
+          </p:cNvPr>
+          <p:cNvSpPr txBox="1"/>
+          <p:nvPr/>
+        </p:nvSpPr>
+        <p:spPr>
+          <a:xfrm>
+            <a:off x="10481377" y="511499"/>
+            <a:ext cx="739491" cy="584775"/>
+          </a:xfrm>
+          <a:prstGeom prst="rect">
+            <a:avLst/>
+          </a:prstGeom>
+          <a:noFill/>
+        </p:spPr>
+        <p:txBody>
+          <a:bodyPr wrap="square" rtlCol="0">
+            <a:spAutoFit/>
+          </a:bodyPr>
+          <a:lstStyle/>
+          <a:p>
+            <a:pPr algn="l"/>
+            <a:r>
+              <a:rPr lang="de-DE" sz="800" dirty="0"/>
+              <a:t>Michael Rudyj,</a:t>
+            </a:r>
+          </a:p>
+          <a:p>
+            <a:pPr algn="l"/>
+            <a:endParaRPr lang="de-DE" sz="800" dirty="0"/>
+          </a:p>
+          <a:p>
+            <a:pPr algn="l"/>
+            <a:r>
+              <a:rPr lang="de-DE" sz="800" dirty="0"/>
+              <a:t>Gruppe 1</a:t>
+            </a:r>
           </a:p>
         </p:txBody>
       </p:sp>
@@ -6502,6 +7160,53 @@
           </a:p>
         </p:txBody>
       </p:sp>
+      <p:sp>
+        <p:nvSpPr>
+          <p:cNvPr id="5" name="Textfeld 4">
+            <a:extLst>
+              <a:ext uri="{FF2B5EF4-FFF2-40B4-BE49-F238E27FC236}">
+                <a16:creationId xmlns:a16="http://schemas.microsoft.com/office/drawing/2014/main" id="{0E8C8C54-8ABE-4CCA-AEDA-3347D7F0E200}"/>
+              </a:ext>
+            </a:extLst>
+          </p:cNvPr>
+          <p:cNvSpPr txBox="1"/>
+          <p:nvPr/>
+        </p:nvSpPr>
+        <p:spPr>
+          <a:xfrm>
+            <a:off x="10481377" y="511499"/>
+            <a:ext cx="739491" cy="584775"/>
+          </a:xfrm>
+          <a:prstGeom prst="rect">
+            <a:avLst/>
+          </a:prstGeom>
+          <a:noFill/>
+        </p:spPr>
+        <p:txBody>
+          <a:bodyPr wrap="square" rtlCol="0">
+            <a:spAutoFit/>
+          </a:bodyPr>
+          <a:lstStyle/>
+          <a:p>
+            <a:pPr algn="l"/>
+            <a:r>
+              <a:rPr lang="de-DE" sz="800" dirty="0"/>
+              <a:t>Michael Rudyj,</a:t>
+            </a:r>
+          </a:p>
+          <a:p>
+            <a:pPr algn="l"/>
+            <a:endParaRPr lang="de-DE" sz="800" dirty="0"/>
+          </a:p>
+          <a:p>
+            <a:pPr algn="l"/>
+            <a:r>
+              <a:rPr lang="de-DE" sz="800" dirty="0"/>
+              <a:t>Gruppe 1</a:t>
+            </a:r>
+          </a:p>
+        </p:txBody>
+      </p:sp>
     </p:spTree>
     <p:extLst>
       <p:ext uri="{BB962C8B-B14F-4D97-AF65-F5344CB8AC3E}">
@@ -6706,7 +7411,7 @@
           <p:nvPr/>
         </p:nvPicPr>
         <p:blipFill>
-          <a:blip r:embed="rId2"/>
+          <a:blip r:embed="rId3"/>
           <a:stretch>
             <a:fillRect/>
           </a:stretch>
@@ -6736,7 +7441,7 @@
           <p:nvPr/>
         </p:nvPicPr>
         <p:blipFill>
-          <a:blip r:embed="rId3"/>
+          <a:blip r:embed="rId4"/>
           <a:stretch>
             <a:fillRect/>
           </a:stretch>
@@ -6766,7 +7471,7 @@
           <p:nvPr/>
         </p:nvPicPr>
         <p:blipFill>
-          <a:blip r:embed="rId4"/>
+          <a:blip r:embed="rId5"/>
           <a:stretch>
             <a:fillRect/>
           </a:stretch>
@@ -6796,7 +7501,7 @@
           <p:nvPr/>
         </p:nvPicPr>
         <p:blipFill>
-          <a:blip r:embed="rId5"/>
+          <a:blip r:embed="rId6"/>
           <a:stretch>
             <a:fillRect/>
           </a:stretch>
@@ -6826,7 +7531,7 @@
           <p:nvPr/>
         </p:nvPicPr>
         <p:blipFill>
-          <a:blip r:embed="rId6"/>
+          <a:blip r:embed="rId7"/>
           <a:stretch>
             <a:fillRect/>
           </a:stretch>
@@ -6856,7 +7561,7 @@
           <p:nvPr/>
         </p:nvPicPr>
         <p:blipFill>
-          <a:blip r:embed="rId7"/>
+          <a:blip r:embed="rId8"/>
           <a:stretch>
             <a:fillRect/>
           </a:stretch>
@@ -6886,7 +7591,7 @@
           <p:nvPr/>
         </p:nvPicPr>
         <p:blipFill>
-          <a:blip r:embed="rId8"/>
+          <a:blip r:embed="rId9"/>
           <a:stretch>
             <a:fillRect/>
           </a:stretch>
@@ -6916,7 +7621,7 @@
           <p:nvPr/>
         </p:nvPicPr>
         <p:blipFill>
-          <a:blip r:embed="rId9"/>
+          <a:blip r:embed="rId10"/>
           <a:stretch>
             <a:fillRect/>
           </a:stretch>
@@ -6946,7 +7651,7 @@
           <p:nvPr/>
         </p:nvPicPr>
         <p:blipFill>
-          <a:blip r:embed="rId10"/>
+          <a:blip r:embed="rId11"/>
           <a:stretch>
             <a:fillRect/>
           </a:stretch>
@@ -6976,7 +7681,7 @@
           <p:nvPr/>
         </p:nvPicPr>
         <p:blipFill>
-          <a:blip r:embed="rId11"/>
+          <a:blip r:embed="rId12"/>
           <a:stretch>
             <a:fillRect/>
           </a:stretch>
@@ -6993,10 +7698,10 @@
       </p:pic>
       <p:sp>
         <p:nvSpPr>
-          <p:cNvPr id="18" name="Textfeld 17">
+          <p:cNvPr id="3" name="Textfeld 2">
             <a:extLst>
               <a:ext uri="{FF2B5EF4-FFF2-40B4-BE49-F238E27FC236}">
-                <a16:creationId xmlns:a16="http://schemas.microsoft.com/office/drawing/2014/main" id="{5C86AA9F-84CD-4C67-8224-1DC495A8914D}"/>
+                <a16:creationId xmlns:a16="http://schemas.microsoft.com/office/drawing/2014/main" id="{37BC6C8B-3C09-4DD7-9AF5-B7F17A621624}"/>
               </a:ext>
             </a:extLst>
           </p:cNvPr>
@@ -7005,8 +7710,8 @@
         </p:nvSpPr>
         <p:spPr>
           <a:xfrm>
-            <a:off x="6420120" y="5160772"/>
-            <a:ext cx="3223260" cy="230832"/>
+            <a:off x="10481377" y="511499"/>
+            <a:ext cx="739491" cy="584775"/>
           </a:xfrm>
           <a:prstGeom prst="rect">
             <a:avLst/>
@@ -7019,9 +7724,21 @@
           </a:bodyPr>
           <a:lstStyle/>
           <a:p>
-            <a:r>
-              <a:rPr lang="de-DE" sz="900" dirty="0"/>
-              <a:t>1.000 Punkte</a:t>
+            <a:pPr algn="l"/>
+            <a:r>
+              <a:rPr lang="de-DE" sz="800" dirty="0"/>
+              <a:t>Michael Rudyj,</a:t>
+            </a:r>
+          </a:p>
+          <a:p>
+            <a:pPr algn="l"/>
+            <a:endParaRPr lang="de-DE" sz="800" dirty="0"/>
+          </a:p>
+          <a:p>
+            <a:pPr algn="l"/>
+            <a:r>
+              <a:rPr lang="de-DE" sz="800" dirty="0"/>
+              <a:t>Gruppe 1</a:t>
             </a:r>
           </a:p>
         </p:txBody>
@@ -7865,7 +8582,9 @@
           </a:xfrm>
         </p:spPr>
         <p:txBody>
-          <a:bodyPr/>
+          <a:bodyPr>
+            <a:normAutofit lnSpcReduction="10000"/>
+          </a:bodyPr>
           <a:lstStyle/>
           <a:p>
             <a:pPr marL="285750" indent="-285750">
@@ -7902,7 +8621,7 @@
               <a:rPr lang="de-DE" dirty="0">
                 <a:sym typeface="Wingdings" pitchFamily="2" charset="2"/>
               </a:rPr>
-              <a:t> Kurve steigt langsam gegen ca. 0,63</a:t>
+              <a:t> Kurve steigt langsam gegen den ersten Attraktor</a:t>
             </a:r>
           </a:p>
           <a:p>
@@ -7914,7 +8633,7 @@
               <a:rPr lang="de-DE" dirty="0">
                 <a:sym typeface="Wingdings" pitchFamily="2" charset="2"/>
               </a:rPr>
-              <a:t>Bereich 3 – ca. 3,5  Kurve Teilt sich, Werte oszillieren (erster Bifurkationspunkt)</a:t>
+              <a:t>Bereich 3 – ca. 3,45  Kurve Teilt sich, Werte oszillieren zwischen den neuen Attraktoren (erster Bifurkationspunkt)</a:t>
             </a:r>
           </a:p>
           <a:p>
@@ -7924,7 +8643,7 @@
             </a:pPr>
             <a:r>
               <a:rPr lang="de-DE" dirty="0"/>
-              <a:t>Bereich ca. 3,5 – ca. 3,6 </a:t>
+              <a:t>Bereich ca. 3,45 – ca. 3,55 </a:t>
             </a:r>
             <a:r>
               <a:rPr lang="de-DE" dirty="0">
@@ -7996,6 +8715,53 @@
             <a:r>
               <a:rPr lang="de-DE" sz="900" dirty="0"/>
               <a:t>500 Iterationen, 10.000 Punkte</a:t>
+            </a:r>
+          </a:p>
+        </p:txBody>
+      </p:sp>
+      <p:sp>
+        <p:nvSpPr>
+          <p:cNvPr id="7" name="Textfeld 6">
+            <a:extLst>
+              <a:ext uri="{FF2B5EF4-FFF2-40B4-BE49-F238E27FC236}">
+                <a16:creationId xmlns:a16="http://schemas.microsoft.com/office/drawing/2014/main" id="{F21F7621-BA9E-4573-9D68-A43F34DE6CA9}"/>
+              </a:ext>
+            </a:extLst>
+          </p:cNvPr>
+          <p:cNvSpPr txBox="1"/>
+          <p:nvPr/>
+        </p:nvSpPr>
+        <p:spPr>
+          <a:xfrm>
+            <a:off x="10481377" y="511499"/>
+            <a:ext cx="739491" cy="584775"/>
+          </a:xfrm>
+          <a:prstGeom prst="rect">
+            <a:avLst/>
+          </a:prstGeom>
+          <a:noFill/>
+        </p:spPr>
+        <p:txBody>
+          <a:bodyPr wrap="square" rtlCol="0">
+            <a:spAutoFit/>
+          </a:bodyPr>
+          <a:lstStyle/>
+          <a:p>
+            <a:pPr algn="l"/>
+            <a:r>
+              <a:rPr lang="de-DE" sz="800" dirty="0"/>
+              <a:t>Michael Rudyj,</a:t>
+            </a:r>
+          </a:p>
+          <a:p>
+            <a:pPr algn="l"/>
+            <a:endParaRPr lang="de-DE" sz="800" dirty="0"/>
+          </a:p>
+          <a:p>
+            <a:pPr algn="l"/>
+            <a:r>
+              <a:rPr lang="de-DE" sz="800" dirty="0"/>
+              <a:t>Gruppe 1</a:t>
             </a:r>
           </a:p>
         </p:txBody>
@@ -8320,16 +9086,21 @@
             <p:ph type="body" sz="half" idx="2"/>
           </p:nvPr>
         </p:nvSpPr>
-        <p:spPr/>
+        <p:spPr>
+          <a:xfrm>
+            <a:off x="1154954" y="3657599"/>
+            <a:ext cx="5084979" cy="1574807"/>
+          </a:xfrm>
+        </p:spPr>
         <p:txBody>
           <a:bodyPr>
-            <a:normAutofit/>
+            <a:normAutofit fontScale="92500" lnSpcReduction="20000"/>
           </a:bodyPr>
           <a:lstStyle/>
           <a:p>
             <a:r>
               <a:rPr lang="de-DE" dirty="0"/>
-              <a:t>Ab R = ca. 3,6 sind neue Bifurkationen erkennbar, ABER:</a:t>
+              <a:t>Ab hier sind neue Bifurkationen erkennbar, ABER:</a:t>
             </a:r>
           </a:p>
           <a:p>
@@ -8353,12 +9124,26 @@
             </a:r>
           </a:p>
           <a:p>
-            <a:r>
-              <a:rPr lang="de-DE" dirty="0">
-                <a:sym typeface="Wingdings" pitchFamily="2" charset="2"/>
-              </a:rPr>
-              <a:t>	 chaotisch anmutendes Verhalten</a:t>
-            </a:r>
+            <a:pPr marL="285750" indent="-285750">
+              <a:buFont typeface="Arial" panose="020B0604020202020204" pitchFamily="34" charset="0"/>
+              <a:buChar char="•"/>
+            </a:pPr>
+            <a:r>
+              <a:rPr lang="de-DE" dirty="0"/>
+              <a:t>Bifurkationen übergehen ins Chaos</a:t>
+            </a:r>
+          </a:p>
+          <a:p>
+            <a:pPr marL="285750" indent="-285750">
+              <a:buFont typeface="Arial" panose="020B0604020202020204" pitchFamily="34" charset="0"/>
+              <a:buChar char="•"/>
+            </a:pPr>
+            <a:r>
+              <a:rPr lang="de-DE" dirty="0"/>
+              <a:t>„Brücken“ im chaotischen Verhalten, die wiederum Feigenbäume sind</a:t>
+            </a:r>
+          </a:p>
+          <a:p>
             <a:endParaRPr lang="de-DE" dirty="0"/>
           </a:p>
         </p:txBody>
@@ -8428,6 +9213,53 @@
           </a:p>
         </p:txBody>
       </p:sp>
+      <p:sp>
+        <p:nvSpPr>
+          <p:cNvPr id="3" name="Textfeld 2">
+            <a:extLst>
+              <a:ext uri="{FF2B5EF4-FFF2-40B4-BE49-F238E27FC236}">
+                <a16:creationId xmlns:a16="http://schemas.microsoft.com/office/drawing/2014/main" id="{2A5608B3-31F4-40E2-9CAF-9EA77E65E0CA}"/>
+              </a:ext>
+            </a:extLst>
+          </p:cNvPr>
+          <p:cNvSpPr txBox="1"/>
+          <p:nvPr/>
+        </p:nvSpPr>
+        <p:spPr>
+          <a:xfrm>
+            <a:off x="10481377" y="511499"/>
+            <a:ext cx="739491" cy="584775"/>
+          </a:xfrm>
+          <a:prstGeom prst="rect">
+            <a:avLst/>
+          </a:prstGeom>
+          <a:noFill/>
+        </p:spPr>
+        <p:txBody>
+          <a:bodyPr wrap="square" rtlCol="0">
+            <a:spAutoFit/>
+          </a:bodyPr>
+          <a:lstStyle/>
+          <a:p>
+            <a:pPr algn="l"/>
+            <a:r>
+              <a:rPr lang="de-DE" sz="800" dirty="0"/>
+              <a:t>Michael Rudyj,</a:t>
+            </a:r>
+          </a:p>
+          <a:p>
+            <a:pPr algn="l"/>
+            <a:endParaRPr lang="de-DE" sz="800" dirty="0"/>
+          </a:p>
+          <a:p>
+            <a:pPr algn="l"/>
+            <a:r>
+              <a:rPr lang="de-DE" sz="800" dirty="0"/>
+              <a:t>Gruppe 1</a:t>
+            </a:r>
+          </a:p>
+        </p:txBody>
+      </p:sp>
     </p:spTree>
     <p:extLst>
       <p:ext uri="{BB962C8B-B14F-4D97-AF65-F5344CB8AC3E}">
@@ -8549,13 +9381,60 @@
           <a:p>
             <a:r>
               <a:rPr lang="de-DE" dirty="0"/>
-              <a:t>Beschreibt den Faktor mit dem Sich Abstände und Intensität der Bifurkationen verringern</a:t>
+              <a:t>Beschreibt den Faktor mit dem sich Abstände der Bifurkationen verringern</a:t>
             </a:r>
           </a:p>
           <a:p>
             <a:r>
               <a:rPr lang="de-DE" dirty="0"/>
               <a:t>Universell für eine Ganze Gattung von Gleichungen mit chaotisch-sensitivem Verhalten</a:t>
+            </a:r>
+          </a:p>
+        </p:txBody>
+      </p:sp>
+      <p:sp>
+        <p:nvSpPr>
+          <p:cNvPr id="5" name="Textfeld 4">
+            <a:extLst>
+              <a:ext uri="{FF2B5EF4-FFF2-40B4-BE49-F238E27FC236}">
+                <a16:creationId xmlns:a16="http://schemas.microsoft.com/office/drawing/2014/main" id="{E7182FFF-AE24-4502-9472-5BB7EC7A2004}"/>
+              </a:ext>
+            </a:extLst>
+          </p:cNvPr>
+          <p:cNvSpPr txBox="1"/>
+          <p:nvPr/>
+        </p:nvSpPr>
+        <p:spPr>
+          <a:xfrm>
+            <a:off x="10481377" y="511499"/>
+            <a:ext cx="739491" cy="584775"/>
+          </a:xfrm>
+          <a:prstGeom prst="rect">
+            <a:avLst/>
+          </a:prstGeom>
+          <a:noFill/>
+        </p:spPr>
+        <p:txBody>
+          <a:bodyPr wrap="square" rtlCol="0">
+            <a:spAutoFit/>
+          </a:bodyPr>
+          <a:lstStyle/>
+          <a:p>
+            <a:pPr algn="l"/>
+            <a:r>
+              <a:rPr lang="de-DE" sz="800" dirty="0"/>
+              <a:t>Michael Rudyj,</a:t>
+            </a:r>
+          </a:p>
+          <a:p>
+            <a:pPr algn="l"/>
+            <a:endParaRPr lang="de-DE" sz="800" dirty="0"/>
+          </a:p>
+          <a:p>
+            <a:pPr algn="l"/>
+            <a:r>
+              <a:rPr lang="de-DE" sz="800" dirty="0"/>
+              <a:t>Gruppe 1</a:t>
             </a:r>
           </a:p>
         </p:txBody>
@@ -8727,6 +9606,53 @@
           </a:p>
         </p:txBody>
       </p:sp>
+      <p:sp>
+        <p:nvSpPr>
+          <p:cNvPr id="5" name="Textfeld 4">
+            <a:extLst>
+              <a:ext uri="{FF2B5EF4-FFF2-40B4-BE49-F238E27FC236}">
+                <a16:creationId xmlns:a16="http://schemas.microsoft.com/office/drawing/2014/main" id="{FD7DF479-1310-4D6B-B032-E3B2F40003F4}"/>
+              </a:ext>
+            </a:extLst>
+          </p:cNvPr>
+          <p:cNvSpPr txBox="1"/>
+          <p:nvPr/>
+        </p:nvSpPr>
+        <p:spPr>
+          <a:xfrm>
+            <a:off x="10481377" y="511499"/>
+            <a:ext cx="739491" cy="584775"/>
+          </a:xfrm>
+          <a:prstGeom prst="rect">
+            <a:avLst/>
+          </a:prstGeom>
+          <a:noFill/>
+        </p:spPr>
+        <p:txBody>
+          <a:bodyPr wrap="square" rtlCol="0">
+            <a:spAutoFit/>
+          </a:bodyPr>
+          <a:lstStyle/>
+          <a:p>
+            <a:pPr algn="l"/>
+            <a:r>
+              <a:rPr lang="de-DE" sz="800" dirty="0"/>
+              <a:t>Michael Rudyj,</a:t>
+            </a:r>
+          </a:p>
+          <a:p>
+            <a:pPr algn="l"/>
+            <a:endParaRPr lang="de-DE" sz="800" dirty="0"/>
+          </a:p>
+          <a:p>
+            <a:pPr algn="l"/>
+            <a:r>
+              <a:rPr lang="de-DE" sz="800" dirty="0"/>
+              <a:t>Gruppe 1</a:t>
+            </a:r>
+          </a:p>
+        </p:txBody>
+      </p:sp>
     </p:spTree>
     <p:extLst>
       <p:ext uri="{BB962C8B-B14F-4D97-AF65-F5344CB8AC3E}">
@@ -8948,7 +9874,54 @@
           <a:p>
             <a:r>
               <a:rPr lang="de-DE" dirty="0"/>
-              <a:t>Beispiele: Doppelspaltversuch, radioaktiver Zerfall,	 menschliches Gehirn (freier Wille)?</a:t>
+              <a:t>Beispiele: radioaktiver Zerfall, menschliches Gehirn (freier Wille)?</a:t>
+            </a:r>
+          </a:p>
+        </p:txBody>
+      </p:sp>
+      <p:sp>
+        <p:nvSpPr>
+          <p:cNvPr id="8" name="Textfeld 7">
+            <a:extLst>
+              <a:ext uri="{FF2B5EF4-FFF2-40B4-BE49-F238E27FC236}">
+                <a16:creationId xmlns:a16="http://schemas.microsoft.com/office/drawing/2014/main" id="{4A7CDA7A-992F-4627-AE8E-50B976CAFD2A}"/>
+              </a:ext>
+            </a:extLst>
+          </p:cNvPr>
+          <p:cNvSpPr txBox="1"/>
+          <p:nvPr/>
+        </p:nvSpPr>
+        <p:spPr>
+          <a:xfrm>
+            <a:off x="10481377" y="511499"/>
+            <a:ext cx="739491" cy="584775"/>
+          </a:xfrm>
+          <a:prstGeom prst="rect">
+            <a:avLst/>
+          </a:prstGeom>
+          <a:noFill/>
+        </p:spPr>
+        <p:txBody>
+          <a:bodyPr wrap="square" rtlCol="0">
+            <a:spAutoFit/>
+          </a:bodyPr>
+          <a:lstStyle/>
+          <a:p>
+            <a:pPr algn="l"/>
+            <a:r>
+              <a:rPr lang="de-DE" sz="800" dirty="0"/>
+              <a:t>Michael Rudyj,</a:t>
+            </a:r>
+          </a:p>
+          <a:p>
+            <a:pPr algn="l"/>
+            <a:endParaRPr lang="de-DE" sz="800" dirty="0"/>
+          </a:p>
+          <a:p>
+            <a:pPr algn="l"/>
+            <a:r>
+              <a:rPr lang="de-DE" sz="800" dirty="0"/>
+              <a:t>Gruppe 1</a:t>
             </a:r>
           </a:p>
         </p:txBody>
@@ -9224,6 +10197,53 @@
               <a:t>“</a:t>
             </a:r>
             <a:endParaRPr lang="de-DE" dirty="0"/>
+          </a:p>
+        </p:txBody>
+      </p:sp>
+      <p:sp>
+        <p:nvSpPr>
+          <p:cNvPr id="3" name="Textfeld 2">
+            <a:extLst>
+              <a:ext uri="{FF2B5EF4-FFF2-40B4-BE49-F238E27FC236}">
+                <a16:creationId xmlns:a16="http://schemas.microsoft.com/office/drawing/2014/main" id="{611FBB66-2265-459D-B665-B2F3ABFBC68B}"/>
+              </a:ext>
+            </a:extLst>
+          </p:cNvPr>
+          <p:cNvSpPr txBox="1"/>
+          <p:nvPr/>
+        </p:nvSpPr>
+        <p:spPr>
+          <a:xfrm>
+            <a:off x="10481377" y="511499"/>
+            <a:ext cx="739491" cy="584775"/>
+          </a:xfrm>
+          <a:prstGeom prst="rect">
+            <a:avLst/>
+          </a:prstGeom>
+          <a:noFill/>
+        </p:spPr>
+        <p:txBody>
+          <a:bodyPr wrap="square" rtlCol="0">
+            <a:spAutoFit/>
+          </a:bodyPr>
+          <a:lstStyle/>
+          <a:p>
+            <a:pPr algn="l"/>
+            <a:r>
+              <a:rPr lang="de-DE" sz="800" dirty="0"/>
+              <a:t>Michael Rudyj,</a:t>
+            </a:r>
+          </a:p>
+          <a:p>
+            <a:pPr algn="l"/>
+            <a:endParaRPr lang="de-DE" sz="800" dirty="0"/>
+          </a:p>
+          <a:p>
+            <a:pPr algn="l"/>
+            <a:r>
+              <a:rPr lang="de-DE" sz="800" dirty="0"/>
+              <a:t>Gruppe 1</a:t>
+            </a:r>
           </a:p>
         </p:txBody>
       </p:sp>
@@ -9504,4 +10524,299 @@
     </a:ext>
   </a:extLst>
 </a:theme>
+</file>
+
+<file path=ppt/theme/theme2.xml><?xml version="1.0" encoding="utf-8"?>
+<a:theme xmlns:a="http://schemas.openxmlformats.org/drawingml/2006/main" name="Office">
+  <a:themeElements>
+    <a:clrScheme name="Office">
+      <a:dk1>
+        <a:sysClr val="windowText" lastClr="000000"/>
+      </a:dk1>
+      <a:lt1>
+        <a:sysClr val="window" lastClr="FFFFFF"/>
+      </a:lt1>
+      <a:dk2>
+        <a:srgbClr val="44546A"/>
+      </a:dk2>
+      <a:lt2>
+        <a:srgbClr val="E7E6E6"/>
+      </a:lt2>
+      <a:accent1>
+        <a:srgbClr val="4472C4"/>
+      </a:accent1>
+      <a:accent2>
+        <a:srgbClr val="ED7D31"/>
+      </a:accent2>
+      <a:accent3>
+        <a:srgbClr val="A5A5A5"/>
+      </a:accent3>
+      <a:accent4>
+        <a:srgbClr val="FFC000"/>
+      </a:accent4>
+      <a:accent5>
+        <a:srgbClr val="5B9BD5"/>
+      </a:accent5>
+      <a:accent6>
+        <a:srgbClr val="70AD47"/>
+      </a:accent6>
+      <a:hlink>
+        <a:srgbClr val="0563C1"/>
+      </a:hlink>
+      <a:folHlink>
+        <a:srgbClr val="954F72"/>
+      </a:folHlink>
+    </a:clrScheme>
+    <a:fontScheme name="Office">
+      <a:majorFont>
+        <a:latin typeface="Calibri Light" panose="020F0302020204030204"/>
+        <a:ea typeface=""/>
+        <a:cs typeface=""/>
+        <a:font script="Jpan" typeface="游ゴシック Light"/>
+        <a:font script="Hang" typeface="맑은 고딕"/>
+        <a:font script="Hans" typeface="等线 Light"/>
+        <a:font script="Hant" typeface="新細明體"/>
+        <a:font script="Arab" typeface="Times New Roman"/>
+        <a:font script="Hebr" typeface="Times New Roman"/>
+        <a:font script="Thai" typeface="Angsana New"/>
+        <a:font script="Ethi" typeface="Nyala"/>
+        <a:font script="Beng" typeface="Vrinda"/>
+        <a:font script="Gujr" typeface="Shruti"/>
+        <a:font script="Khmr" typeface="MoolBoran"/>
+        <a:font script="Knda" typeface="Tunga"/>
+        <a:font script="Guru" typeface="Raavi"/>
+        <a:font script="Cans" typeface="Euphemia"/>
+        <a:font script="Cher" typeface="Plantagenet Cherokee"/>
+        <a:font script="Yiii" typeface="Microsoft Yi Baiti"/>
+        <a:font script="Tibt" typeface="Microsoft Himalaya"/>
+        <a:font script="Thaa" typeface="MV Boli"/>
+        <a:font script="Deva" typeface="Mangal"/>
+        <a:font script="Telu" typeface="Gautami"/>
+        <a:font script="Taml" typeface="Latha"/>
+        <a:font script="Syrc" typeface="Estrangelo Edessa"/>
+        <a:font script="Orya" typeface="Kalinga"/>
+        <a:font script="Mlym" typeface="Kartika"/>
+        <a:font script="Laoo" typeface="DokChampa"/>
+        <a:font script="Sinh" typeface="Iskoola Pota"/>
+        <a:font script="Mong" typeface="Mongolian Baiti"/>
+        <a:font script="Viet" typeface="Times New Roman"/>
+        <a:font script="Uigh" typeface="Microsoft Uighur"/>
+        <a:font script="Geor" typeface="Sylfaen"/>
+        <a:font script="Armn" typeface="Arial"/>
+        <a:font script="Bugi" typeface="Leelawadee UI"/>
+        <a:font script="Bopo" typeface="Microsoft JhengHei"/>
+        <a:font script="Java" typeface="Javanese Text"/>
+        <a:font script="Lisu" typeface="Segoe UI"/>
+        <a:font script="Mymr" typeface="Myanmar Text"/>
+        <a:font script="Nkoo" typeface="Ebrima"/>
+        <a:font script="Olck" typeface="Nirmala UI"/>
+        <a:font script="Osma" typeface="Ebrima"/>
+        <a:font script="Phag" typeface="Phagspa"/>
+        <a:font script="Syrn" typeface="Estrangelo Edessa"/>
+        <a:font script="Syrj" typeface="Estrangelo Edessa"/>
+        <a:font script="Syre" typeface="Estrangelo Edessa"/>
+        <a:font script="Sora" typeface="Nirmala UI"/>
+        <a:font script="Tale" typeface="Microsoft Tai Le"/>
+        <a:font script="Talu" typeface="Microsoft New Tai Lue"/>
+        <a:font script="Tfng" typeface="Ebrima"/>
+      </a:majorFont>
+      <a:minorFont>
+        <a:latin typeface="Calibri" panose="020F0502020204030204"/>
+        <a:ea typeface=""/>
+        <a:cs typeface=""/>
+        <a:font script="Jpan" typeface="游ゴシック"/>
+        <a:font script="Hang" typeface="맑은 고딕"/>
+        <a:font script="Hans" typeface="等线"/>
+        <a:font script="Hant" typeface="新細明體"/>
+        <a:font script="Arab" typeface="Arial"/>
+        <a:font script="Hebr" typeface="Arial"/>
+        <a:font script="Thai" typeface="Cordia New"/>
+        <a:font script="Ethi" typeface="Nyala"/>
+        <a:font script="Beng" typeface="Vrinda"/>
+        <a:font script="Gujr" typeface="Shruti"/>
+        <a:font script="Khmr" typeface="DaunPenh"/>
+        <a:font script="Knda" typeface="Tunga"/>
+        <a:font script="Guru" typeface="Raavi"/>
+        <a:font script="Cans" typeface="Euphemia"/>
+        <a:font script="Cher" typeface="Plantagenet Cherokee"/>
+        <a:font script="Yiii" typeface="Microsoft Yi Baiti"/>
+        <a:font script="Tibt" typeface="Microsoft Himalaya"/>
+        <a:font script="Thaa" typeface="MV Boli"/>
+        <a:font script="Deva" typeface="Mangal"/>
+        <a:font script="Telu" typeface="Gautami"/>
+        <a:font script="Taml" typeface="Latha"/>
+        <a:font script="Syrc" typeface="Estrangelo Edessa"/>
+        <a:font script="Orya" typeface="Kalinga"/>
+        <a:font script="Mlym" typeface="Kartika"/>
+        <a:font script="Laoo" typeface="DokChampa"/>
+        <a:font script="Sinh" typeface="Iskoola Pota"/>
+        <a:font script="Mong" typeface="Mongolian Baiti"/>
+        <a:font script="Viet" typeface="Arial"/>
+        <a:font script="Uigh" typeface="Microsoft Uighur"/>
+        <a:font script="Geor" typeface="Sylfaen"/>
+        <a:font script="Armn" typeface="Arial"/>
+        <a:font script="Bugi" typeface="Leelawadee UI"/>
+        <a:font script="Bopo" typeface="Microsoft JhengHei"/>
+        <a:font script="Java" typeface="Javanese Text"/>
+        <a:font script="Lisu" typeface="Segoe UI"/>
+        <a:font script="Mymr" typeface="Myanmar Text"/>
+        <a:font script="Nkoo" typeface="Ebrima"/>
+        <a:font script="Olck" typeface="Nirmala UI"/>
+        <a:font script="Osma" typeface="Ebrima"/>
+        <a:font script="Phag" typeface="Phagspa"/>
+        <a:font script="Syrn" typeface="Estrangelo Edessa"/>
+        <a:font script="Syrj" typeface="Estrangelo Edessa"/>
+        <a:font script="Syre" typeface="Estrangelo Edessa"/>
+        <a:font script="Sora" typeface="Nirmala UI"/>
+        <a:font script="Tale" typeface="Microsoft Tai Le"/>
+        <a:font script="Talu" typeface="Microsoft New Tai Lue"/>
+        <a:font script="Tfng" typeface="Ebrima"/>
+      </a:minorFont>
+    </a:fontScheme>
+    <a:fmtScheme name="Office">
+      <a:fillStyleLst>
+        <a:solidFill>
+          <a:schemeClr val="phClr"/>
+        </a:solidFill>
+        <a:gradFill rotWithShape="1">
+          <a:gsLst>
+            <a:gs pos="0">
+              <a:schemeClr val="phClr">
+                <a:lumMod val="110000"/>
+                <a:satMod val="105000"/>
+                <a:tint val="67000"/>
+              </a:schemeClr>
+            </a:gs>
+            <a:gs pos="50000">
+              <a:schemeClr val="phClr">
+                <a:lumMod val="105000"/>
+                <a:satMod val="103000"/>
+                <a:tint val="73000"/>
+              </a:schemeClr>
+            </a:gs>
+            <a:gs pos="100000">
+              <a:schemeClr val="phClr">
+                <a:lumMod val="105000"/>
+                <a:satMod val="109000"/>
+                <a:tint val="81000"/>
+              </a:schemeClr>
+            </a:gs>
+          </a:gsLst>
+          <a:lin ang="5400000" scaled="0"/>
+        </a:gradFill>
+        <a:gradFill rotWithShape="1">
+          <a:gsLst>
+            <a:gs pos="0">
+              <a:schemeClr val="phClr">
+                <a:satMod val="103000"/>
+                <a:lumMod val="102000"/>
+                <a:tint val="94000"/>
+              </a:schemeClr>
+            </a:gs>
+            <a:gs pos="50000">
+              <a:schemeClr val="phClr">
+                <a:satMod val="110000"/>
+                <a:lumMod val="100000"/>
+                <a:shade val="100000"/>
+              </a:schemeClr>
+            </a:gs>
+            <a:gs pos="100000">
+              <a:schemeClr val="phClr">
+                <a:lumMod val="99000"/>
+                <a:satMod val="120000"/>
+                <a:shade val="78000"/>
+              </a:schemeClr>
+            </a:gs>
+          </a:gsLst>
+          <a:lin ang="5400000" scaled="0"/>
+        </a:gradFill>
+      </a:fillStyleLst>
+      <a:lnStyleLst>
+        <a:ln w="6350" cap="flat" cmpd="sng" algn="ctr">
+          <a:solidFill>
+            <a:schemeClr val="phClr"/>
+          </a:solidFill>
+          <a:prstDash val="solid"/>
+          <a:miter lim="800000"/>
+        </a:ln>
+        <a:ln w="12700" cap="flat" cmpd="sng" algn="ctr">
+          <a:solidFill>
+            <a:schemeClr val="phClr"/>
+          </a:solidFill>
+          <a:prstDash val="solid"/>
+          <a:miter lim="800000"/>
+        </a:ln>
+        <a:ln w="19050" cap="flat" cmpd="sng" algn="ctr">
+          <a:solidFill>
+            <a:schemeClr val="phClr"/>
+          </a:solidFill>
+          <a:prstDash val="solid"/>
+          <a:miter lim="800000"/>
+        </a:ln>
+      </a:lnStyleLst>
+      <a:effectStyleLst>
+        <a:effectStyle>
+          <a:effectLst/>
+        </a:effectStyle>
+        <a:effectStyle>
+          <a:effectLst/>
+        </a:effectStyle>
+        <a:effectStyle>
+          <a:effectLst>
+            <a:outerShdw blurRad="57150" dist="19050" dir="5400000" algn="ctr" rotWithShape="0">
+              <a:srgbClr val="000000">
+                <a:alpha val="63000"/>
+              </a:srgbClr>
+            </a:outerShdw>
+          </a:effectLst>
+        </a:effectStyle>
+      </a:effectStyleLst>
+      <a:bgFillStyleLst>
+        <a:solidFill>
+          <a:schemeClr val="phClr"/>
+        </a:solidFill>
+        <a:solidFill>
+          <a:schemeClr val="phClr">
+            <a:tint val="95000"/>
+            <a:satMod val="170000"/>
+          </a:schemeClr>
+        </a:solidFill>
+        <a:gradFill rotWithShape="1">
+          <a:gsLst>
+            <a:gs pos="0">
+              <a:schemeClr val="phClr">
+                <a:tint val="93000"/>
+                <a:satMod val="150000"/>
+                <a:shade val="98000"/>
+                <a:lumMod val="102000"/>
+              </a:schemeClr>
+            </a:gs>
+            <a:gs pos="50000">
+              <a:schemeClr val="phClr">
+                <a:tint val="98000"/>
+                <a:satMod val="130000"/>
+                <a:shade val="90000"/>
+                <a:lumMod val="103000"/>
+              </a:schemeClr>
+            </a:gs>
+            <a:gs pos="100000">
+              <a:schemeClr val="phClr">
+                <a:shade val="63000"/>
+                <a:satMod val="120000"/>
+              </a:schemeClr>
+            </a:gs>
+          </a:gsLst>
+          <a:lin ang="5400000" scaled="0"/>
+        </a:gradFill>
+      </a:bgFillStyleLst>
+    </a:fmtScheme>
+  </a:themeElements>
+  <a:objectDefaults/>
+  <a:extraClrSchemeLst/>
+  <a:extLst>
+    <a:ext uri="{05A4C25C-085E-4340-85A3-A5531E510DB2}">
+      <thm15:themeFamily xmlns:thm15="http://schemas.microsoft.com/office/thememl/2012/main" name="Office Theme" id="{62F939B6-93AF-4DB8-9C6B-D6C7DFDC589F}" vid="{4A3C46E8-61CC-4603-A589-7422A47A8E4A}"/>
+    </a:ext>
+  </a:extLst>
+</a:theme>
 </file>
</xml_diff>

<commit_message>
Minor adjustments in Feigenbaum
</commit_message>
<xml_diff>
--- a/Feigenbaum&Sensitivität.pptx
+++ b/Feigenbaum&Sensitivität.pptx
@@ -7115,6 +7115,13 @@
             <a:r>
               <a:rPr lang="de-DE" dirty="0"/>
               <a:t>Feigenbaum-Diagramm</a:t>
+            </a:r>
+          </a:p>
+          <a:p>
+            <a:pPr lvl="2"/>
+            <a:r>
+              <a:rPr lang="de-DE" dirty="0"/>
+              <a:t>Grundlagen</a:t>
             </a:r>
           </a:p>
           <a:p>
@@ -9590,7 +9597,7 @@
             </a:pPr>
             <a:r>
               <a:rPr lang="de-DE" dirty="0"/>
-              <a:t>Haben kleine Änderungen stark unterschiedliche Ergebnisse zu folge wirkt das System chaotisch</a:t>
+              <a:t>Haben sehr kleine Änderungen stark unterschiedliche Ergebnisse zu folge wirkt das System chaotisch</a:t>
             </a:r>
           </a:p>
           <a:p>

</xml_diff>